<commit_message>
Collections Ch 7 & 8: fixed numbers; tables; charts; deleted old charts
</commit_message>
<xml_diff>
--- a/part1/Figures/collections/empty-product.pptx
+++ b/part1/Figures/collections/empty-product.pptx
@@ -1,6 +1,6 @@
 
 <file path=ppt/presentation.xml><?xml version="1.0" encoding="utf-8"?>
-<p:presentation xmlns:a="http://schemas.openxmlformats.org/drawingml/2006/main" xmlns:r="http://schemas.openxmlformats.org/officeDocument/2006/relationships" xmlns:mc="http://schemas.openxmlformats.org/markup-compatibility/2006" xmlns:mv="urn:schemas-microsoft-com:mac:vml" xmlns:p="http://schemas.openxmlformats.org/presentationml/2006/main" mc:Ignorable="mv" mc:PreserveAttributes="mv:*" saveSubsetFonts="1" autoCompressPictures="0">
+<p:presentation xmlns:a="http://schemas.openxmlformats.org/drawingml/2006/main" xmlns:r="http://schemas.openxmlformats.org/officeDocument/2006/relationships" xmlns:p="http://schemas.openxmlformats.org/presentationml/2006/main" saveSubsetFonts="1" autoCompressPictures="0">
   <p:sldMasterIdLst>
     <p:sldMasterId id="2147483648" r:id="rId1"/>
   </p:sldMasterIdLst>
@@ -8,99 +8,129 @@
     <p:sldId id="258" r:id="rId2"/>
   </p:sldIdLst>
   <p:sldSz cx="9144000" cy="6858000" type="screen4x3"/>
-  <p:notesSz cx="6858000" cy="9144000"/>
+  <p:notesSz cx="7315200" cy="9601200"/>
   <p:defaultTextStyle>
     <a:defPPr>
       <a:defRPr lang="en-US"/>
     </a:defPPr>
-    <a:lvl1pPr marL="0" algn="l" defTabSz="457200" rtl="0" eaLnBrk="1" latinLnBrk="0" hangingPunct="1">
-      <a:defRPr sz="1800" kern="1200">
+    <a:lvl1pPr algn="l" defTabSz="457200" rtl="0" fontAlgn="base">
+      <a:spcBef>
+        <a:spcPct val="0"/>
+      </a:spcBef>
+      <a:spcAft>
+        <a:spcPct val="0"/>
+      </a:spcAft>
+      <a:defRPr kern="1200">
         <a:solidFill>
           <a:schemeClr val="tx1"/>
         </a:solidFill>
-        <a:latin typeface="+mn-lt"/>
+        <a:latin typeface="Arial" charset="0"/>
         <a:ea typeface="+mn-ea"/>
-        <a:cs typeface="+mn-cs"/>
+        <a:cs typeface="Arial" charset="0"/>
       </a:defRPr>
     </a:lvl1pPr>
-    <a:lvl2pPr marL="457200" algn="l" defTabSz="457200" rtl="0" eaLnBrk="1" latinLnBrk="0" hangingPunct="1">
-      <a:defRPr sz="1800" kern="1200">
+    <a:lvl2pPr marL="457200" algn="l" defTabSz="457200" rtl="0" fontAlgn="base">
+      <a:spcBef>
+        <a:spcPct val="0"/>
+      </a:spcBef>
+      <a:spcAft>
+        <a:spcPct val="0"/>
+      </a:spcAft>
+      <a:defRPr kern="1200">
         <a:solidFill>
           <a:schemeClr val="tx1"/>
         </a:solidFill>
-        <a:latin typeface="+mn-lt"/>
+        <a:latin typeface="Arial" charset="0"/>
         <a:ea typeface="+mn-ea"/>
-        <a:cs typeface="+mn-cs"/>
+        <a:cs typeface="Arial" charset="0"/>
       </a:defRPr>
     </a:lvl2pPr>
-    <a:lvl3pPr marL="914400" algn="l" defTabSz="457200" rtl="0" eaLnBrk="1" latinLnBrk="0" hangingPunct="1">
-      <a:defRPr sz="1800" kern="1200">
+    <a:lvl3pPr marL="914400" algn="l" defTabSz="457200" rtl="0" fontAlgn="base">
+      <a:spcBef>
+        <a:spcPct val="0"/>
+      </a:spcBef>
+      <a:spcAft>
+        <a:spcPct val="0"/>
+      </a:spcAft>
+      <a:defRPr kern="1200">
         <a:solidFill>
           <a:schemeClr val="tx1"/>
         </a:solidFill>
-        <a:latin typeface="+mn-lt"/>
+        <a:latin typeface="Arial" charset="0"/>
         <a:ea typeface="+mn-ea"/>
-        <a:cs typeface="+mn-cs"/>
+        <a:cs typeface="Arial" charset="0"/>
       </a:defRPr>
     </a:lvl3pPr>
-    <a:lvl4pPr marL="1371600" algn="l" defTabSz="457200" rtl="0" eaLnBrk="1" latinLnBrk="0" hangingPunct="1">
-      <a:defRPr sz="1800" kern="1200">
+    <a:lvl4pPr marL="1371600" algn="l" defTabSz="457200" rtl="0" fontAlgn="base">
+      <a:spcBef>
+        <a:spcPct val="0"/>
+      </a:spcBef>
+      <a:spcAft>
+        <a:spcPct val="0"/>
+      </a:spcAft>
+      <a:defRPr kern="1200">
         <a:solidFill>
           <a:schemeClr val="tx1"/>
         </a:solidFill>
-        <a:latin typeface="+mn-lt"/>
+        <a:latin typeface="Arial" charset="0"/>
         <a:ea typeface="+mn-ea"/>
-        <a:cs typeface="+mn-cs"/>
+        <a:cs typeface="Arial" charset="0"/>
       </a:defRPr>
     </a:lvl4pPr>
-    <a:lvl5pPr marL="1828800" algn="l" defTabSz="457200" rtl="0" eaLnBrk="1" latinLnBrk="0" hangingPunct="1">
-      <a:defRPr sz="1800" kern="1200">
+    <a:lvl5pPr marL="1828800" algn="l" defTabSz="457200" rtl="0" fontAlgn="base">
+      <a:spcBef>
+        <a:spcPct val="0"/>
+      </a:spcBef>
+      <a:spcAft>
+        <a:spcPct val="0"/>
+      </a:spcAft>
+      <a:defRPr kern="1200">
         <a:solidFill>
           <a:schemeClr val="tx1"/>
         </a:solidFill>
-        <a:latin typeface="+mn-lt"/>
+        <a:latin typeface="Arial" charset="0"/>
         <a:ea typeface="+mn-ea"/>
-        <a:cs typeface="+mn-cs"/>
+        <a:cs typeface="Arial" charset="0"/>
       </a:defRPr>
     </a:lvl5pPr>
-    <a:lvl6pPr marL="2286000" algn="l" defTabSz="457200" rtl="0" eaLnBrk="1" latinLnBrk="0" hangingPunct="1">
-      <a:defRPr sz="1800" kern="1200">
+    <a:lvl6pPr marL="2286000" algn="l" defTabSz="914400" rtl="0" eaLnBrk="1" latinLnBrk="0" hangingPunct="1">
+      <a:defRPr kern="1200">
         <a:solidFill>
           <a:schemeClr val="tx1"/>
         </a:solidFill>
-        <a:latin typeface="+mn-lt"/>
+        <a:latin typeface="Arial" charset="0"/>
         <a:ea typeface="+mn-ea"/>
-        <a:cs typeface="+mn-cs"/>
+        <a:cs typeface="Arial" charset="0"/>
       </a:defRPr>
     </a:lvl6pPr>
-    <a:lvl7pPr marL="2743200" algn="l" defTabSz="457200" rtl="0" eaLnBrk="1" latinLnBrk="0" hangingPunct="1">
-      <a:defRPr sz="1800" kern="1200">
+    <a:lvl7pPr marL="2743200" algn="l" defTabSz="914400" rtl="0" eaLnBrk="1" latinLnBrk="0" hangingPunct="1">
+      <a:defRPr kern="1200">
         <a:solidFill>
           <a:schemeClr val="tx1"/>
         </a:solidFill>
-        <a:latin typeface="+mn-lt"/>
+        <a:latin typeface="Arial" charset="0"/>
         <a:ea typeface="+mn-ea"/>
-        <a:cs typeface="+mn-cs"/>
+        <a:cs typeface="Arial" charset="0"/>
       </a:defRPr>
     </a:lvl7pPr>
-    <a:lvl8pPr marL="3200400" algn="l" defTabSz="457200" rtl="0" eaLnBrk="1" latinLnBrk="0" hangingPunct="1">
-      <a:defRPr sz="1800" kern="1200">
+    <a:lvl8pPr marL="3200400" algn="l" defTabSz="914400" rtl="0" eaLnBrk="1" latinLnBrk="0" hangingPunct="1">
+      <a:defRPr kern="1200">
         <a:solidFill>
           <a:schemeClr val="tx1"/>
         </a:solidFill>
-        <a:latin typeface="+mn-lt"/>
+        <a:latin typeface="Arial" charset="0"/>
         <a:ea typeface="+mn-ea"/>
-        <a:cs typeface="+mn-cs"/>
+        <a:cs typeface="Arial" charset="0"/>
       </a:defRPr>
     </a:lvl8pPr>
-    <a:lvl9pPr marL="3657600" algn="l" defTabSz="457200" rtl="0" eaLnBrk="1" latinLnBrk="0" hangingPunct="1">
-      <a:defRPr sz="1800" kern="1200">
+    <a:lvl9pPr marL="3657600" algn="l" defTabSz="914400" rtl="0" eaLnBrk="1" latinLnBrk="0" hangingPunct="1">
+      <a:defRPr kern="1200">
         <a:solidFill>
           <a:schemeClr val="tx1"/>
         </a:solidFill>
-        <a:latin typeface="+mn-lt"/>
+        <a:latin typeface="Arial" charset="0"/>
         <a:ea typeface="+mn-ea"/>
-        <a:cs typeface="+mn-cs"/>
+        <a:cs typeface="Arial" charset="0"/>
       </a:defRPr>
     </a:lvl9pPr>
   </p:defaultTextStyle>
@@ -108,7 +138,7 @@
 </file>
 
 <file path=ppt/slideLayouts/slideLayout1.xml><?xml version="1.0" encoding="utf-8"?>
-<p:sldLayout xmlns:a="http://schemas.openxmlformats.org/drawingml/2006/main" xmlns:r="http://schemas.openxmlformats.org/officeDocument/2006/relationships" xmlns:mc="http://schemas.openxmlformats.org/markup-compatibility/2006" xmlns:mv="urn:schemas-microsoft-com:mac:vml" xmlns:p="http://schemas.openxmlformats.org/presentationml/2006/main" mc:Ignorable="mv" mc:PreserveAttributes="mv:*" type="title" preserve="1">
+<p:sldLayout xmlns:a="http://schemas.openxmlformats.org/drawingml/2006/main" xmlns:r="http://schemas.openxmlformats.org/officeDocument/2006/relationships" xmlns:p="http://schemas.openxmlformats.org/presentationml/2006/main" type="title" preserve="1">
   <p:cSld name="Title Slide">
     <p:spTree>
       <p:nvGrpSpPr>
@@ -284,12 +314,21 @@
         <p:spPr/>
         <p:txBody>
           <a:bodyPr/>
-          <a:lstStyle/>
-          <a:p>
-            <a:fld id="{3D7BA643-B6E4-5F47-8F97-5B8A5CDFA610}" type="datetimeFigureOut">
-              <a:rPr lang="en-US" smtClean="0"/>
-              <a:pPr/>
-              <a:t>4/20/11</a:t>
+          <a:lstStyle>
+            <a:lvl1pPr>
+              <a:defRPr/>
+            </a:lvl1pPr>
+          </a:lstStyle>
+          <a:p>
+            <a:pPr>
+              <a:defRPr/>
+            </a:pPr>
+            <a:fld id="{4F7DF419-DB1A-4E74-9232-C31E5DEDE518}" type="datetimeFigureOut">
+              <a:rPr lang="en-US"/>
+              <a:pPr>
+                <a:defRPr/>
+              </a:pPr>
+              <a:t>6/15/2012</a:t>
             </a:fld>
             <a:endParaRPr lang="en-US"/>
           </a:p>
@@ -308,8 +347,15 @@
         <p:spPr/>
         <p:txBody>
           <a:bodyPr/>
-          <a:lstStyle/>
-          <a:p>
+          <a:lstStyle>
+            <a:lvl1pPr>
+              <a:defRPr/>
+            </a:lvl1pPr>
+          </a:lstStyle>
+          <a:p>
+            <a:pPr>
+              <a:defRPr/>
+            </a:pPr>
             <a:endParaRPr lang="en-US"/>
           </a:p>
         </p:txBody>
@@ -327,11 +373,20 @@
         <p:spPr/>
         <p:txBody>
           <a:bodyPr/>
-          <a:lstStyle/>
-          <a:p>
-            <a:fld id="{B6D880B0-D896-B448-AD62-E3A08F4BBC35}" type="slidenum">
-              <a:rPr lang="en-US" smtClean="0"/>
-              <a:pPr/>
+          <a:lstStyle>
+            <a:lvl1pPr>
+              <a:defRPr/>
+            </a:lvl1pPr>
+          </a:lstStyle>
+          <a:p>
+            <a:pPr>
+              <a:defRPr/>
+            </a:pPr>
+            <a:fld id="{0BE0898B-0C0D-4D18-B059-40511940AB32}" type="slidenum">
+              <a:rPr lang="en-US"/>
+              <a:pPr>
+                <a:defRPr/>
+              </a:pPr>
               <a:t>‹#›</a:t>
             </a:fld>
             <a:endParaRPr lang="en-US"/>
@@ -347,7 +402,7 @@
 </file>
 
 <file path=ppt/slideLayouts/slideLayout10.xml><?xml version="1.0" encoding="utf-8"?>
-<p:sldLayout xmlns:a="http://schemas.openxmlformats.org/drawingml/2006/main" xmlns:r="http://schemas.openxmlformats.org/officeDocument/2006/relationships" xmlns:mc="http://schemas.openxmlformats.org/markup-compatibility/2006" xmlns:mv="urn:schemas-microsoft-com:mac:vml" xmlns:p="http://schemas.openxmlformats.org/presentationml/2006/main" mc:Ignorable="mv" mc:PreserveAttributes="mv:*" type="vertTx" preserve="1">
+<p:sldLayout xmlns:a="http://schemas.openxmlformats.org/drawingml/2006/main" xmlns:r="http://schemas.openxmlformats.org/officeDocument/2006/relationships" xmlns:p="http://schemas.openxmlformats.org/presentationml/2006/main" type="vertTx" preserve="1">
   <p:cSld name="Title and Vertical Text">
     <p:spTree>
       <p:nvGrpSpPr>
@@ -451,12 +506,21 @@
         <p:spPr/>
         <p:txBody>
           <a:bodyPr/>
-          <a:lstStyle/>
-          <a:p>
-            <a:fld id="{3D7BA643-B6E4-5F47-8F97-5B8A5CDFA610}" type="datetimeFigureOut">
-              <a:rPr lang="en-US" smtClean="0"/>
-              <a:pPr/>
-              <a:t>4/20/11</a:t>
+          <a:lstStyle>
+            <a:lvl1pPr>
+              <a:defRPr/>
+            </a:lvl1pPr>
+          </a:lstStyle>
+          <a:p>
+            <a:pPr>
+              <a:defRPr/>
+            </a:pPr>
+            <a:fld id="{2049C6B1-AF30-4963-AA27-8E7EF140DB9B}" type="datetimeFigureOut">
+              <a:rPr lang="en-US"/>
+              <a:pPr>
+                <a:defRPr/>
+              </a:pPr>
+              <a:t>6/15/2012</a:t>
             </a:fld>
             <a:endParaRPr lang="en-US"/>
           </a:p>
@@ -475,8 +539,15 @@
         <p:spPr/>
         <p:txBody>
           <a:bodyPr/>
-          <a:lstStyle/>
-          <a:p>
+          <a:lstStyle>
+            <a:lvl1pPr>
+              <a:defRPr/>
+            </a:lvl1pPr>
+          </a:lstStyle>
+          <a:p>
+            <a:pPr>
+              <a:defRPr/>
+            </a:pPr>
             <a:endParaRPr lang="en-US"/>
           </a:p>
         </p:txBody>
@@ -494,11 +565,20 @@
         <p:spPr/>
         <p:txBody>
           <a:bodyPr/>
-          <a:lstStyle/>
-          <a:p>
-            <a:fld id="{B6D880B0-D896-B448-AD62-E3A08F4BBC35}" type="slidenum">
-              <a:rPr lang="en-US" smtClean="0"/>
-              <a:pPr/>
+          <a:lstStyle>
+            <a:lvl1pPr>
+              <a:defRPr/>
+            </a:lvl1pPr>
+          </a:lstStyle>
+          <a:p>
+            <a:pPr>
+              <a:defRPr/>
+            </a:pPr>
+            <a:fld id="{11B765CA-740D-4BD9-9784-5942604099B0}" type="slidenum">
+              <a:rPr lang="en-US"/>
+              <a:pPr>
+                <a:defRPr/>
+              </a:pPr>
               <a:t>‹#›</a:t>
             </a:fld>
             <a:endParaRPr lang="en-US"/>
@@ -514,7 +594,7 @@
 </file>
 
 <file path=ppt/slideLayouts/slideLayout11.xml><?xml version="1.0" encoding="utf-8"?>
-<p:sldLayout xmlns:a="http://schemas.openxmlformats.org/drawingml/2006/main" xmlns:r="http://schemas.openxmlformats.org/officeDocument/2006/relationships" xmlns:mc="http://schemas.openxmlformats.org/markup-compatibility/2006" xmlns:mv="urn:schemas-microsoft-com:mac:vml" xmlns:p="http://schemas.openxmlformats.org/presentationml/2006/main" mc:Ignorable="mv" mc:PreserveAttributes="mv:*" type="vertTitleAndTx" preserve="1">
+<p:sldLayout xmlns:a="http://schemas.openxmlformats.org/drawingml/2006/main" xmlns:r="http://schemas.openxmlformats.org/officeDocument/2006/relationships" xmlns:p="http://schemas.openxmlformats.org/presentationml/2006/main" type="vertTitleAndTx" preserve="1">
   <p:cSld name="Vertical Title and Text">
     <p:spTree>
       <p:nvGrpSpPr>
@@ -628,12 +708,21 @@
         <p:spPr/>
         <p:txBody>
           <a:bodyPr/>
-          <a:lstStyle/>
-          <a:p>
-            <a:fld id="{3D7BA643-B6E4-5F47-8F97-5B8A5CDFA610}" type="datetimeFigureOut">
-              <a:rPr lang="en-US" smtClean="0"/>
-              <a:pPr/>
-              <a:t>4/20/11</a:t>
+          <a:lstStyle>
+            <a:lvl1pPr>
+              <a:defRPr/>
+            </a:lvl1pPr>
+          </a:lstStyle>
+          <a:p>
+            <a:pPr>
+              <a:defRPr/>
+            </a:pPr>
+            <a:fld id="{A971B162-7A31-409E-9B0A-E02607847F71}" type="datetimeFigureOut">
+              <a:rPr lang="en-US"/>
+              <a:pPr>
+                <a:defRPr/>
+              </a:pPr>
+              <a:t>6/15/2012</a:t>
             </a:fld>
             <a:endParaRPr lang="en-US"/>
           </a:p>
@@ -652,8 +741,15 @@
         <p:spPr/>
         <p:txBody>
           <a:bodyPr/>
-          <a:lstStyle/>
-          <a:p>
+          <a:lstStyle>
+            <a:lvl1pPr>
+              <a:defRPr/>
+            </a:lvl1pPr>
+          </a:lstStyle>
+          <a:p>
+            <a:pPr>
+              <a:defRPr/>
+            </a:pPr>
             <a:endParaRPr lang="en-US"/>
           </a:p>
         </p:txBody>
@@ -671,11 +767,20 @@
         <p:spPr/>
         <p:txBody>
           <a:bodyPr/>
-          <a:lstStyle/>
-          <a:p>
-            <a:fld id="{B6D880B0-D896-B448-AD62-E3A08F4BBC35}" type="slidenum">
-              <a:rPr lang="en-US" smtClean="0"/>
-              <a:pPr/>
+          <a:lstStyle>
+            <a:lvl1pPr>
+              <a:defRPr/>
+            </a:lvl1pPr>
+          </a:lstStyle>
+          <a:p>
+            <a:pPr>
+              <a:defRPr/>
+            </a:pPr>
+            <a:fld id="{392A6A2F-E982-4884-8065-44D8ADB7A7B3}" type="slidenum">
+              <a:rPr lang="en-US"/>
+              <a:pPr>
+                <a:defRPr/>
+              </a:pPr>
               <a:t>‹#›</a:t>
             </a:fld>
             <a:endParaRPr lang="en-US"/>
@@ -691,7 +796,7 @@
 </file>
 
 <file path=ppt/slideLayouts/slideLayout2.xml><?xml version="1.0" encoding="utf-8"?>
-<p:sldLayout xmlns:a="http://schemas.openxmlformats.org/drawingml/2006/main" xmlns:r="http://schemas.openxmlformats.org/officeDocument/2006/relationships" xmlns:mc="http://schemas.openxmlformats.org/markup-compatibility/2006" xmlns:mv="urn:schemas-microsoft-com:mac:vml" xmlns:p="http://schemas.openxmlformats.org/presentationml/2006/main" mc:Ignorable="mv" mc:PreserveAttributes="mv:*" type="obj" preserve="1">
+<p:sldLayout xmlns:a="http://schemas.openxmlformats.org/drawingml/2006/main" xmlns:r="http://schemas.openxmlformats.org/officeDocument/2006/relationships" xmlns:p="http://schemas.openxmlformats.org/presentationml/2006/main" type="obj" preserve="1">
   <p:cSld name="Title and Content">
     <p:spTree>
       <p:nvGrpSpPr>
@@ -795,12 +900,21 @@
         <p:spPr/>
         <p:txBody>
           <a:bodyPr/>
-          <a:lstStyle/>
-          <a:p>
-            <a:fld id="{3D7BA643-B6E4-5F47-8F97-5B8A5CDFA610}" type="datetimeFigureOut">
-              <a:rPr lang="en-US" smtClean="0"/>
-              <a:pPr/>
-              <a:t>4/20/11</a:t>
+          <a:lstStyle>
+            <a:lvl1pPr>
+              <a:defRPr/>
+            </a:lvl1pPr>
+          </a:lstStyle>
+          <a:p>
+            <a:pPr>
+              <a:defRPr/>
+            </a:pPr>
+            <a:fld id="{2C5C7724-1CD3-453A-A660-2A1757A5ACCE}" type="datetimeFigureOut">
+              <a:rPr lang="en-US"/>
+              <a:pPr>
+                <a:defRPr/>
+              </a:pPr>
+              <a:t>6/15/2012</a:t>
             </a:fld>
             <a:endParaRPr lang="en-US"/>
           </a:p>
@@ -819,8 +933,15 @@
         <p:spPr/>
         <p:txBody>
           <a:bodyPr/>
-          <a:lstStyle/>
-          <a:p>
+          <a:lstStyle>
+            <a:lvl1pPr>
+              <a:defRPr/>
+            </a:lvl1pPr>
+          </a:lstStyle>
+          <a:p>
+            <a:pPr>
+              <a:defRPr/>
+            </a:pPr>
             <a:endParaRPr lang="en-US"/>
           </a:p>
         </p:txBody>
@@ -838,11 +959,20 @@
         <p:spPr/>
         <p:txBody>
           <a:bodyPr/>
-          <a:lstStyle/>
-          <a:p>
-            <a:fld id="{B6D880B0-D896-B448-AD62-E3A08F4BBC35}" type="slidenum">
-              <a:rPr lang="en-US" smtClean="0"/>
-              <a:pPr/>
+          <a:lstStyle>
+            <a:lvl1pPr>
+              <a:defRPr/>
+            </a:lvl1pPr>
+          </a:lstStyle>
+          <a:p>
+            <a:pPr>
+              <a:defRPr/>
+            </a:pPr>
+            <a:fld id="{FAD5DD12-C65C-4DB5-AABD-A42ACCFF5B68}" type="slidenum">
+              <a:rPr lang="en-US"/>
+              <a:pPr>
+                <a:defRPr/>
+              </a:pPr>
               <a:t>‹#›</a:t>
             </a:fld>
             <a:endParaRPr lang="en-US"/>
@@ -858,7 +988,7 @@
 </file>
 
 <file path=ppt/slideLayouts/slideLayout3.xml><?xml version="1.0" encoding="utf-8"?>
-<p:sldLayout xmlns:a="http://schemas.openxmlformats.org/drawingml/2006/main" xmlns:r="http://schemas.openxmlformats.org/officeDocument/2006/relationships" xmlns:mc="http://schemas.openxmlformats.org/markup-compatibility/2006" xmlns:mv="urn:schemas-microsoft-com:mac:vml" xmlns:p="http://schemas.openxmlformats.org/presentationml/2006/main" mc:Ignorable="mv" mc:PreserveAttributes="mv:*" type="secHead" preserve="1">
+<p:sldLayout xmlns:a="http://schemas.openxmlformats.org/drawingml/2006/main" xmlns:r="http://schemas.openxmlformats.org/officeDocument/2006/relationships" xmlns:p="http://schemas.openxmlformats.org/presentationml/2006/main" type="secHead" preserve="1">
   <p:cSld name="Section Header">
     <p:spTree>
       <p:nvGrpSpPr>
@@ -1038,12 +1168,21 @@
         <p:spPr/>
         <p:txBody>
           <a:bodyPr/>
-          <a:lstStyle/>
-          <a:p>
-            <a:fld id="{3D7BA643-B6E4-5F47-8F97-5B8A5CDFA610}" type="datetimeFigureOut">
-              <a:rPr lang="en-US" smtClean="0"/>
-              <a:pPr/>
-              <a:t>4/20/11</a:t>
+          <a:lstStyle>
+            <a:lvl1pPr>
+              <a:defRPr/>
+            </a:lvl1pPr>
+          </a:lstStyle>
+          <a:p>
+            <a:pPr>
+              <a:defRPr/>
+            </a:pPr>
+            <a:fld id="{6A681449-092F-4C4B-97C7-FB91E051A886}" type="datetimeFigureOut">
+              <a:rPr lang="en-US"/>
+              <a:pPr>
+                <a:defRPr/>
+              </a:pPr>
+              <a:t>6/15/2012</a:t>
             </a:fld>
             <a:endParaRPr lang="en-US"/>
           </a:p>
@@ -1062,8 +1201,15 @@
         <p:spPr/>
         <p:txBody>
           <a:bodyPr/>
-          <a:lstStyle/>
-          <a:p>
+          <a:lstStyle>
+            <a:lvl1pPr>
+              <a:defRPr/>
+            </a:lvl1pPr>
+          </a:lstStyle>
+          <a:p>
+            <a:pPr>
+              <a:defRPr/>
+            </a:pPr>
             <a:endParaRPr lang="en-US"/>
           </a:p>
         </p:txBody>
@@ -1081,11 +1227,20 @@
         <p:spPr/>
         <p:txBody>
           <a:bodyPr/>
-          <a:lstStyle/>
-          <a:p>
-            <a:fld id="{B6D880B0-D896-B448-AD62-E3A08F4BBC35}" type="slidenum">
-              <a:rPr lang="en-US" smtClean="0"/>
-              <a:pPr/>
+          <a:lstStyle>
+            <a:lvl1pPr>
+              <a:defRPr/>
+            </a:lvl1pPr>
+          </a:lstStyle>
+          <a:p>
+            <a:pPr>
+              <a:defRPr/>
+            </a:pPr>
+            <a:fld id="{0F493570-C6CE-498D-AD78-137147AD4B07}" type="slidenum">
+              <a:rPr lang="en-US"/>
+              <a:pPr>
+                <a:defRPr/>
+              </a:pPr>
               <a:t>‹#›</a:t>
             </a:fld>
             <a:endParaRPr lang="en-US"/>
@@ -1101,7 +1256,7 @@
 </file>
 
 <file path=ppt/slideLayouts/slideLayout4.xml><?xml version="1.0" encoding="utf-8"?>
-<p:sldLayout xmlns:a="http://schemas.openxmlformats.org/drawingml/2006/main" xmlns:r="http://schemas.openxmlformats.org/officeDocument/2006/relationships" xmlns:mc="http://schemas.openxmlformats.org/markup-compatibility/2006" xmlns:mv="urn:schemas-microsoft-com:mac:vml" xmlns:p="http://schemas.openxmlformats.org/presentationml/2006/main" mc:Ignorable="mv" mc:PreserveAttributes="mv:*" type="twoObj" preserve="1">
+<p:sldLayout xmlns:a="http://schemas.openxmlformats.org/drawingml/2006/main" xmlns:r="http://schemas.openxmlformats.org/officeDocument/2006/relationships" xmlns:p="http://schemas.openxmlformats.org/presentationml/2006/main" type="twoObj" preserve="1">
   <p:cSld name="Two Content">
     <p:spTree>
       <p:nvGrpSpPr>
@@ -1312,7 +1467,7 @@
       </p:sp>
       <p:sp>
         <p:nvSpPr>
-          <p:cNvPr id="5" name="Date Placeholder 4"/>
+          <p:cNvPr id="5" name="Date Placeholder 3"/>
           <p:cNvSpPr>
             <a:spLocks noGrp="1"/>
           </p:cNvSpPr>
@@ -1323,12 +1478,21 @@
         <p:spPr/>
         <p:txBody>
           <a:bodyPr/>
-          <a:lstStyle/>
-          <a:p>
-            <a:fld id="{3D7BA643-B6E4-5F47-8F97-5B8A5CDFA610}" type="datetimeFigureOut">
-              <a:rPr lang="en-US" smtClean="0"/>
-              <a:pPr/>
-              <a:t>4/20/11</a:t>
+          <a:lstStyle>
+            <a:lvl1pPr>
+              <a:defRPr/>
+            </a:lvl1pPr>
+          </a:lstStyle>
+          <a:p>
+            <a:pPr>
+              <a:defRPr/>
+            </a:pPr>
+            <a:fld id="{7A22959B-6F8B-461D-8A0E-10E785386A7D}" type="datetimeFigureOut">
+              <a:rPr lang="en-US"/>
+              <a:pPr>
+                <a:defRPr/>
+              </a:pPr>
+              <a:t>6/15/2012</a:t>
             </a:fld>
             <a:endParaRPr lang="en-US"/>
           </a:p>
@@ -1336,7 +1500,7 @@
       </p:sp>
       <p:sp>
         <p:nvSpPr>
-          <p:cNvPr id="6" name="Footer Placeholder 5"/>
+          <p:cNvPr id="6" name="Footer Placeholder 4"/>
           <p:cNvSpPr>
             <a:spLocks noGrp="1"/>
           </p:cNvSpPr>
@@ -1347,15 +1511,22 @@
         <p:spPr/>
         <p:txBody>
           <a:bodyPr/>
-          <a:lstStyle/>
-          <a:p>
-            <a:endParaRPr lang="en-US"/>
-          </a:p>
-        </p:txBody>
-      </p:sp>
-      <p:sp>
-        <p:nvSpPr>
-          <p:cNvPr id="7" name="Slide Number Placeholder 6"/>
+          <a:lstStyle>
+            <a:lvl1pPr>
+              <a:defRPr/>
+            </a:lvl1pPr>
+          </a:lstStyle>
+          <a:p>
+            <a:pPr>
+              <a:defRPr/>
+            </a:pPr>
+            <a:endParaRPr lang="en-US"/>
+          </a:p>
+        </p:txBody>
+      </p:sp>
+      <p:sp>
+        <p:nvSpPr>
+          <p:cNvPr id="7" name="Slide Number Placeholder 5"/>
           <p:cNvSpPr>
             <a:spLocks noGrp="1"/>
           </p:cNvSpPr>
@@ -1366,11 +1537,20 @@
         <p:spPr/>
         <p:txBody>
           <a:bodyPr/>
-          <a:lstStyle/>
-          <a:p>
-            <a:fld id="{B6D880B0-D896-B448-AD62-E3A08F4BBC35}" type="slidenum">
-              <a:rPr lang="en-US" smtClean="0"/>
-              <a:pPr/>
+          <a:lstStyle>
+            <a:lvl1pPr>
+              <a:defRPr/>
+            </a:lvl1pPr>
+          </a:lstStyle>
+          <a:p>
+            <a:pPr>
+              <a:defRPr/>
+            </a:pPr>
+            <a:fld id="{57D52D19-0E81-4AC2-AFCC-890742FB447D}" type="slidenum">
+              <a:rPr lang="en-US"/>
+              <a:pPr>
+                <a:defRPr/>
+              </a:pPr>
               <a:t>‹#›</a:t>
             </a:fld>
             <a:endParaRPr lang="en-US"/>
@@ -1386,7 +1566,7 @@
 </file>
 
 <file path=ppt/slideLayouts/slideLayout5.xml><?xml version="1.0" encoding="utf-8"?>
-<p:sldLayout xmlns:a="http://schemas.openxmlformats.org/drawingml/2006/main" xmlns:r="http://schemas.openxmlformats.org/officeDocument/2006/relationships" xmlns:mc="http://schemas.openxmlformats.org/markup-compatibility/2006" xmlns:mv="urn:schemas-microsoft-com:mac:vml" xmlns:p="http://schemas.openxmlformats.org/presentationml/2006/main" mc:Ignorable="mv" mc:PreserveAttributes="mv:*" type="twoTxTwoObj" preserve="1">
+<p:sldLayout xmlns:a="http://schemas.openxmlformats.org/drawingml/2006/main" xmlns:r="http://schemas.openxmlformats.org/officeDocument/2006/relationships" xmlns:p="http://schemas.openxmlformats.org/presentationml/2006/main" type="twoTxTwoObj" preserve="1">
   <p:cSld name="Comparison">
     <p:spTree>
       <p:nvGrpSpPr>
@@ -1731,7 +1911,7 @@
       </p:sp>
       <p:sp>
         <p:nvSpPr>
-          <p:cNvPr id="7" name="Date Placeholder 6"/>
+          <p:cNvPr id="7" name="Date Placeholder 3"/>
           <p:cNvSpPr>
             <a:spLocks noGrp="1"/>
           </p:cNvSpPr>
@@ -1742,12 +1922,21 @@
         <p:spPr/>
         <p:txBody>
           <a:bodyPr/>
-          <a:lstStyle/>
-          <a:p>
-            <a:fld id="{3D7BA643-B6E4-5F47-8F97-5B8A5CDFA610}" type="datetimeFigureOut">
-              <a:rPr lang="en-US" smtClean="0"/>
-              <a:pPr/>
-              <a:t>4/20/11</a:t>
+          <a:lstStyle>
+            <a:lvl1pPr>
+              <a:defRPr/>
+            </a:lvl1pPr>
+          </a:lstStyle>
+          <a:p>
+            <a:pPr>
+              <a:defRPr/>
+            </a:pPr>
+            <a:fld id="{DFD39B36-57DE-4662-843C-5389331AE9BD}" type="datetimeFigureOut">
+              <a:rPr lang="en-US"/>
+              <a:pPr>
+                <a:defRPr/>
+              </a:pPr>
+              <a:t>6/15/2012</a:t>
             </a:fld>
             <a:endParaRPr lang="en-US"/>
           </a:p>
@@ -1755,7 +1944,7 @@
       </p:sp>
       <p:sp>
         <p:nvSpPr>
-          <p:cNvPr id="8" name="Footer Placeholder 7"/>
+          <p:cNvPr id="8" name="Footer Placeholder 4"/>
           <p:cNvSpPr>
             <a:spLocks noGrp="1"/>
           </p:cNvSpPr>
@@ -1766,15 +1955,22 @@
         <p:spPr/>
         <p:txBody>
           <a:bodyPr/>
-          <a:lstStyle/>
-          <a:p>
-            <a:endParaRPr lang="en-US"/>
-          </a:p>
-        </p:txBody>
-      </p:sp>
-      <p:sp>
-        <p:nvSpPr>
-          <p:cNvPr id="9" name="Slide Number Placeholder 8"/>
+          <a:lstStyle>
+            <a:lvl1pPr>
+              <a:defRPr/>
+            </a:lvl1pPr>
+          </a:lstStyle>
+          <a:p>
+            <a:pPr>
+              <a:defRPr/>
+            </a:pPr>
+            <a:endParaRPr lang="en-US"/>
+          </a:p>
+        </p:txBody>
+      </p:sp>
+      <p:sp>
+        <p:nvSpPr>
+          <p:cNvPr id="9" name="Slide Number Placeholder 5"/>
           <p:cNvSpPr>
             <a:spLocks noGrp="1"/>
           </p:cNvSpPr>
@@ -1785,11 +1981,20 @@
         <p:spPr/>
         <p:txBody>
           <a:bodyPr/>
-          <a:lstStyle/>
-          <a:p>
-            <a:fld id="{B6D880B0-D896-B448-AD62-E3A08F4BBC35}" type="slidenum">
-              <a:rPr lang="en-US" smtClean="0"/>
-              <a:pPr/>
+          <a:lstStyle>
+            <a:lvl1pPr>
+              <a:defRPr/>
+            </a:lvl1pPr>
+          </a:lstStyle>
+          <a:p>
+            <a:pPr>
+              <a:defRPr/>
+            </a:pPr>
+            <a:fld id="{ECA44F64-AAA7-4D65-B9BA-1594B8FA68AE}" type="slidenum">
+              <a:rPr lang="en-US"/>
+              <a:pPr>
+                <a:defRPr/>
+              </a:pPr>
               <a:t>‹#›</a:t>
             </a:fld>
             <a:endParaRPr lang="en-US"/>
@@ -1805,7 +2010,7 @@
 </file>
 
 <file path=ppt/slideLayouts/slideLayout6.xml><?xml version="1.0" encoding="utf-8"?>
-<p:sldLayout xmlns:a="http://schemas.openxmlformats.org/drawingml/2006/main" xmlns:r="http://schemas.openxmlformats.org/officeDocument/2006/relationships" xmlns:mc="http://schemas.openxmlformats.org/markup-compatibility/2006" xmlns:mv="urn:schemas-microsoft-com:mac:vml" xmlns:p="http://schemas.openxmlformats.org/presentationml/2006/main" mc:Ignorable="mv" mc:PreserveAttributes="mv:*" type="titleOnly" preserve="1">
+<p:sldLayout xmlns:a="http://schemas.openxmlformats.org/drawingml/2006/main" xmlns:r="http://schemas.openxmlformats.org/officeDocument/2006/relationships" xmlns:p="http://schemas.openxmlformats.org/presentationml/2006/main" type="titleOnly" preserve="1">
   <p:cSld name="Title Only">
     <p:spTree>
       <p:nvGrpSpPr>
@@ -1846,7 +2051,7 @@
       </p:sp>
       <p:sp>
         <p:nvSpPr>
-          <p:cNvPr id="3" name="Date Placeholder 2"/>
+          <p:cNvPr id="3" name="Date Placeholder 3"/>
           <p:cNvSpPr>
             <a:spLocks noGrp="1"/>
           </p:cNvSpPr>
@@ -1857,12 +2062,21 @@
         <p:spPr/>
         <p:txBody>
           <a:bodyPr/>
-          <a:lstStyle/>
-          <a:p>
-            <a:fld id="{3D7BA643-B6E4-5F47-8F97-5B8A5CDFA610}" type="datetimeFigureOut">
-              <a:rPr lang="en-US" smtClean="0"/>
-              <a:pPr/>
-              <a:t>4/20/11</a:t>
+          <a:lstStyle>
+            <a:lvl1pPr>
+              <a:defRPr/>
+            </a:lvl1pPr>
+          </a:lstStyle>
+          <a:p>
+            <a:pPr>
+              <a:defRPr/>
+            </a:pPr>
+            <a:fld id="{A5BD0D24-58CD-4936-8C91-7C4FDCE67F98}" type="datetimeFigureOut">
+              <a:rPr lang="en-US"/>
+              <a:pPr>
+                <a:defRPr/>
+              </a:pPr>
+              <a:t>6/15/2012</a:t>
             </a:fld>
             <a:endParaRPr lang="en-US"/>
           </a:p>
@@ -1870,7 +2084,7 @@
       </p:sp>
       <p:sp>
         <p:nvSpPr>
-          <p:cNvPr id="4" name="Footer Placeholder 3"/>
+          <p:cNvPr id="4" name="Footer Placeholder 4"/>
           <p:cNvSpPr>
             <a:spLocks noGrp="1"/>
           </p:cNvSpPr>
@@ -1881,15 +2095,22 @@
         <p:spPr/>
         <p:txBody>
           <a:bodyPr/>
-          <a:lstStyle/>
-          <a:p>
-            <a:endParaRPr lang="en-US"/>
-          </a:p>
-        </p:txBody>
-      </p:sp>
-      <p:sp>
-        <p:nvSpPr>
-          <p:cNvPr id="5" name="Slide Number Placeholder 4"/>
+          <a:lstStyle>
+            <a:lvl1pPr>
+              <a:defRPr/>
+            </a:lvl1pPr>
+          </a:lstStyle>
+          <a:p>
+            <a:pPr>
+              <a:defRPr/>
+            </a:pPr>
+            <a:endParaRPr lang="en-US"/>
+          </a:p>
+        </p:txBody>
+      </p:sp>
+      <p:sp>
+        <p:nvSpPr>
+          <p:cNvPr id="5" name="Slide Number Placeholder 5"/>
           <p:cNvSpPr>
             <a:spLocks noGrp="1"/>
           </p:cNvSpPr>
@@ -1900,11 +2121,20 @@
         <p:spPr/>
         <p:txBody>
           <a:bodyPr/>
-          <a:lstStyle/>
-          <a:p>
-            <a:fld id="{B6D880B0-D896-B448-AD62-E3A08F4BBC35}" type="slidenum">
-              <a:rPr lang="en-US" smtClean="0"/>
-              <a:pPr/>
+          <a:lstStyle>
+            <a:lvl1pPr>
+              <a:defRPr/>
+            </a:lvl1pPr>
+          </a:lstStyle>
+          <a:p>
+            <a:pPr>
+              <a:defRPr/>
+            </a:pPr>
+            <a:fld id="{6DB9BADC-C5D1-4604-9CA1-EE0634166D11}" type="slidenum">
+              <a:rPr lang="en-US"/>
+              <a:pPr>
+                <a:defRPr/>
+              </a:pPr>
               <a:t>‹#›</a:t>
             </a:fld>
             <a:endParaRPr lang="en-US"/>
@@ -1920,7 +2150,7 @@
 </file>
 
 <file path=ppt/slideLayouts/slideLayout7.xml><?xml version="1.0" encoding="utf-8"?>
-<p:sldLayout xmlns:a="http://schemas.openxmlformats.org/drawingml/2006/main" xmlns:r="http://schemas.openxmlformats.org/officeDocument/2006/relationships" xmlns:mc="http://schemas.openxmlformats.org/markup-compatibility/2006" xmlns:mv="urn:schemas-microsoft-com:mac:vml" xmlns:p="http://schemas.openxmlformats.org/presentationml/2006/main" mc:Ignorable="mv" mc:PreserveAttributes="mv:*" type="blank" preserve="1">
+<p:sldLayout xmlns:a="http://schemas.openxmlformats.org/drawingml/2006/main" xmlns:r="http://schemas.openxmlformats.org/officeDocument/2006/relationships" xmlns:p="http://schemas.openxmlformats.org/presentationml/2006/main" type="blank" preserve="1">
   <p:cSld name="Blank">
     <p:spTree>
       <p:nvGrpSpPr>
@@ -1938,7 +2168,7 @@
       </p:grpSpPr>
       <p:sp>
         <p:nvSpPr>
-          <p:cNvPr id="2" name="Date Placeholder 1"/>
+          <p:cNvPr id="2" name="Date Placeholder 3"/>
           <p:cNvSpPr>
             <a:spLocks noGrp="1"/>
           </p:cNvSpPr>
@@ -1949,12 +2179,21 @@
         <p:spPr/>
         <p:txBody>
           <a:bodyPr/>
-          <a:lstStyle/>
-          <a:p>
-            <a:fld id="{3D7BA643-B6E4-5F47-8F97-5B8A5CDFA610}" type="datetimeFigureOut">
-              <a:rPr lang="en-US" smtClean="0"/>
-              <a:pPr/>
-              <a:t>4/20/11</a:t>
+          <a:lstStyle>
+            <a:lvl1pPr>
+              <a:defRPr/>
+            </a:lvl1pPr>
+          </a:lstStyle>
+          <a:p>
+            <a:pPr>
+              <a:defRPr/>
+            </a:pPr>
+            <a:fld id="{0FB13F33-2F37-4C3E-92C9-8E45FC17E60D}" type="datetimeFigureOut">
+              <a:rPr lang="en-US"/>
+              <a:pPr>
+                <a:defRPr/>
+              </a:pPr>
+              <a:t>6/15/2012</a:t>
             </a:fld>
             <a:endParaRPr lang="en-US"/>
           </a:p>
@@ -1962,7 +2201,7 @@
       </p:sp>
       <p:sp>
         <p:nvSpPr>
-          <p:cNvPr id="3" name="Footer Placeholder 2"/>
+          <p:cNvPr id="3" name="Footer Placeholder 4"/>
           <p:cNvSpPr>
             <a:spLocks noGrp="1"/>
           </p:cNvSpPr>
@@ -1973,15 +2212,22 @@
         <p:spPr/>
         <p:txBody>
           <a:bodyPr/>
-          <a:lstStyle/>
-          <a:p>
-            <a:endParaRPr lang="en-US"/>
-          </a:p>
-        </p:txBody>
-      </p:sp>
-      <p:sp>
-        <p:nvSpPr>
-          <p:cNvPr id="4" name="Slide Number Placeholder 3"/>
+          <a:lstStyle>
+            <a:lvl1pPr>
+              <a:defRPr/>
+            </a:lvl1pPr>
+          </a:lstStyle>
+          <a:p>
+            <a:pPr>
+              <a:defRPr/>
+            </a:pPr>
+            <a:endParaRPr lang="en-US"/>
+          </a:p>
+        </p:txBody>
+      </p:sp>
+      <p:sp>
+        <p:nvSpPr>
+          <p:cNvPr id="4" name="Slide Number Placeholder 5"/>
           <p:cNvSpPr>
             <a:spLocks noGrp="1"/>
           </p:cNvSpPr>
@@ -1992,11 +2238,20 @@
         <p:spPr/>
         <p:txBody>
           <a:bodyPr/>
-          <a:lstStyle/>
-          <a:p>
-            <a:fld id="{B6D880B0-D896-B448-AD62-E3A08F4BBC35}" type="slidenum">
-              <a:rPr lang="en-US" smtClean="0"/>
-              <a:pPr/>
+          <a:lstStyle>
+            <a:lvl1pPr>
+              <a:defRPr/>
+            </a:lvl1pPr>
+          </a:lstStyle>
+          <a:p>
+            <a:pPr>
+              <a:defRPr/>
+            </a:pPr>
+            <a:fld id="{97167790-034C-42C0-9FAC-CADE4BE4EF59}" type="slidenum">
+              <a:rPr lang="en-US"/>
+              <a:pPr>
+                <a:defRPr/>
+              </a:pPr>
               <a:t>‹#›</a:t>
             </a:fld>
             <a:endParaRPr lang="en-US"/>
@@ -2012,7 +2267,7 @@
 </file>
 
 <file path=ppt/slideLayouts/slideLayout8.xml><?xml version="1.0" encoding="utf-8"?>
-<p:sldLayout xmlns:a="http://schemas.openxmlformats.org/drawingml/2006/main" xmlns:r="http://schemas.openxmlformats.org/officeDocument/2006/relationships" xmlns:mc="http://schemas.openxmlformats.org/markup-compatibility/2006" xmlns:mv="urn:schemas-microsoft-com:mac:vml" xmlns:p="http://schemas.openxmlformats.org/presentationml/2006/main" mc:Ignorable="mv" mc:PreserveAttributes="mv:*" type="objTx" preserve="1">
+<p:sldLayout xmlns:a="http://schemas.openxmlformats.org/drawingml/2006/main" xmlns:r="http://schemas.openxmlformats.org/officeDocument/2006/relationships" xmlns:p="http://schemas.openxmlformats.org/presentationml/2006/main" type="objTx" preserve="1">
   <p:cSld name="Content with Caption">
     <p:spTree>
       <p:nvGrpSpPr>
@@ -2212,7 +2467,7 @@
       </p:sp>
       <p:sp>
         <p:nvSpPr>
-          <p:cNvPr id="5" name="Date Placeholder 4"/>
+          <p:cNvPr id="5" name="Date Placeholder 3"/>
           <p:cNvSpPr>
             <a:spLocks noGrp="1"/>
           </p:cNvSpPr>
@@ -2223,12 +2478,21 @@
         <p:spPr/>
         <p:txBody>
           <a:bodyPr/>
-          <a:lstStyle/>
-          <a:p>
-            <a:fld id="{3D7BA643-B6E4-5F47-8F97-5B8A5CDFA610}" type="datetimeFigureOut">
-              <a:rPr lang="en-US" smtClean="0"/>
-              <a:pPr/>
-              <a:t>4/20/11</a:t>
+          <a:lstStyle>
+            <a:lvl1pPr>
+              <a:defRPr/>
+            </a:lvl1pPr>
+          </a:lstStyle>
+          <a:p>
+            <a:pPr>
+              <a:defRPr/>
+            </a:pPr>
+            <a:fld id="{098A6161-B215-4A33-B187-BB6064C7D0BF}" type="datetimeFigureOut">
+              <a:rPr lang="en-US"/>
+              <a:pPr>
+                <a:defRPr/>
+              </a:pPr>
+              <a:t>6/15/2012</a:t>
             </a:fld>
             <a:endParaRPr lang="en-US"/>
           </a:p>
@@ -2236,7 +2500,7 @@
       </p:sp>
       <p:sp>
         <p:nvSpPr>
-          <p:cNvPr id="6" name="Footer Placeholder 5"/>
+          <p:cNvPr id="6" name="Footer Placeholder 4"/>
           <p:cNvSpPr>
             <a:spLocks noGrp="1"/>
           </p:cNvSpPr>
@@ -2247,15 +2511,22 @@
         <p:spPr/>
         <p:txBody>
           <a:bodyPr/>
-          <a:lstStyle/>
-          <a:p>
-            <a:endParaRPr lang="en-US"/>
-          </a:p>
-        </p:txBody>
-      </p:sp>
-      <p:sp>
-        <p:nvSpPr>
-          <p:cNvPr id="7" name="Slide Number Placeholder 6"/>
+          <a:lstStyle>
+            <a:lvl1pPr>
+              <a:defRPr/>
+            </a:lvl1pPr>
+          </a:lstStyle>
+          <a:p>
+            <a:pPr>
+              <a:defRPr/>
+            </a:pPr>
+            <a:endParaRPr lang="en-US"/>
+          </a:p>
+        </p:txBody>
+      </p:sp>
+      <p:sp>
+        <p:nvSpPr>
+          <p:cNvPr id="7" name="Slide Number Placeholder 5"/>
           <p:cNvSpPr>
             <a:spLocks noGrp="1"/>
           </p:cNvSpPr>
@@ -2266,11 +2537,20 @@
         <p:spPr/>
         <p:txBody>
           <a:bodyPr/>
-          <a:lstStyle/>
-          <a:p>
-            <a:fld id="{B6D880B0-D896-B448-AD62-E3A08F4BBC35}" type="slidenum">
-              <a:rPr lang="en-US" smtClean="0"/>
-              <a:pPr/>
+          <a:lstStyle>
+            <a:lvl1pPr>
+              <a:defRPr/>
+            </a:lvl1pPr>
+          </a:lstStyle>
+          <a:p>
+            <a:pPr>
+              <a:defRPr/>
+            </a:pPr>
+            <a:fld id="{12B6E7A6-2712-4F41-8CB6-FC9C622CEED6}" type="slidenum">
+              <a:rPr lang="en-US"/>
+              <a:pPr>
+                <a:defRPr/>
+              </a:pPr>
               <a:t>‹#›</a:t>
             </a:fld>
             <a:endParaRPr lang="en-US"/>
@@ -2286,7 +2566,7 @@
 </file>
 
 <file path=ppt/slideLayouts/slideLayout9.xml><?xml version="1.0" encoding="utf-8"?>
-<p:sldLayout xmlns:a="http://schemas.openxmlformats.org/drawingml/2006/main" xmlns:r="http://schemas.openxmlformats.org/officeDocument/2006/relationships" xmlns:mc="http://schemas.openxmlformats.org/markup-compatibility/2006" xmlns:mv="urn:schemas-microsoft-com:mac:vml" xmlns:p="http://schemas.openxmlformats.org/presentationml/2006/main" mc:Ignorable="mv" mc:PreserveAttributes="mv:*" type="picTx" preserve="1">
+<p:sldLayout xmlns:a="http://schemas.openxmlformats.org/drawingml/2006/main" xmlns:r="http://schemas.openxmlformats.org/officeDocument/2006/relationships" xmlns:p="http://schemas.openxmlformats.org/presentationml/2006/main" type="picTx" preserve="1">
   <p:cSld name="Picture with Caption">
     <p:spTree>
       <p:nvGrpSpPr>
@@ -2351,7 +2631,9 @@
           </a:xfrm>
         </p:spPr>
         <p:txBody>
-          <a:bodyPr/>
+          <a:bodyPr rtlCol="0">
+            <a:normAutofit/>
+          </a:bodyPr>
           <a:lstStyle>
             <a:lvl1pPr marL="0" indent="0">
               <a:buNone/>
@@ -2391,7 +2673,8 @@
             </a:lvl9pPr>
           </a:lstStyle>
           <a:p>
-            <a:endParaRPr lang="en-US"/>
+            <a:pPr lvl="0"/>
+            <a:endParaRPr lang="en-US" noProof="0"/>
           </a:p>
         </p:txBody>
       </p:sp>
@@ -2462,7 +2745,7 @@
       </p:sp>
       <p:sp>
         <p:nvSpPr>
-          <p:cNvPr id="5" name="Date Placeholder 4"/>
+          <p:cNvPr id="5" name="Date Placeholder 3"/>
           <p:cNvSpPr>
             <a:spLocks noGrp="1"/>
           </p:cNvSpPr>
@@ -2473,12 +2756,21 @@
         <p:spPr/>
         <p:txBody>
           <a:bodyPr/>
-          <a:lstStyle/>
-          <a:p>
-            <a:fld id="{3D7BA643-B6E4-5F47-8F97-5B8A5CDFA610}" type="datetimeFigureOut">
-              <a:rPr lang="en-US" smtClean="0"/>
-              <a:pPr/>
-              <a:t>4/20/11</a:t>
+          <a:lstStyle>
+            <a:lvl1pPr>
+              <a:defRPr/>
+            </a:lvl1pPr>
+          </a:lstStyle>
+          <a:p>
+            <a:pPr>
+              <a:defRPr/>
+            </a:pPr>
+            <a:fld id="{F9F2D6B4-543D-4FAE-AB71-75233E98974F}" type="datetimeFigureOut">
+              <a:rPr lang="en-US"/>
+              <a:pPr>
+                <a:defRPr/>
+              </a:pPr>
+              <a:t>6/15/2012</a:t>
             </a:fld>
             <a:endParaRPr lang="en-US"/>
           </a:p>
@@ -2486,7 +2778,7 @@
       </p:sp>
       <p:sp>
         <p:nvSpPr>
-          <p:cNvPr id="6" name="Footer Placeholder 5"/>
+          <p:cNvPr id="6" name="Footer Placeholder 4"/>
           <p:cNvSpPr>
             <a:spLocks noGrp="1"/>
           </p:cNvSpPr>
@@ -2497,15 +2789,22 @@
         <p:spPr/>
         <p:txBody>
           <a:bodyPr/>
-          <a:lstStyle/>
-          <a:p>
-            <a:endParaRPr lang="en-US"/>
-          </a:p>
-        </p:txBody>
-      </p:sp>
-      <p:sp>
-        <p:nvSpPr>
-          <p:cNvPr id="7" name="Slide Number Placeholder 6"/>
+          <a:lstStyle>
+            <a:lvl1pPr>
+              <a:defRPr/>
+            </a:lvl1pPr>
+          </a:lstStyle>
+          <a:p>
+            <a:pPr>
+              <a:defRPr/>
+            </a:pPr>
+            <a:endParaRPr lang="en-US"/>
+          </a:p>
+        </p:txBody>
+      </p:sp>
+      <p:sp>
+        <p:nvSpPr>
+          <p:cNvPr id="7" name="Slide Number Placeholder 5"/>
           <p:cNvSpPr>
             <a:spLocks noGrp="1"/>
           </p:cNvSpPr>
@@ -2516,11 +2815,20 @@
         <p:spPr/>
         <p:txBody>
           <a:bodyPr/>
-          <a:lstStyle/>
-          <a:p>
-            <a:fld id="{B6D880B0-D896-B448-AD62-E3A08F4BBC35}" type="slidenum">
-              <a:rPr lang="en-US" smtClean="0"/>
-              <a:pPr/>
+          <a:lstStyle>
+            <a:lvl1pPr>
+              <a:defRPr/>
+            </a:lvl1pPr>
+          </a:lstStyle>
+          <a:p>
+            <a:pPr>
+              <a:defRPr/>
+            </a:pPr>
+            <a:fld id="{4A431DDE-7CB3-4770-859B-17FFE10ADDF2}" type="slidenum">
+              <a:rPr lang="en-US"/>
+              <a:pPr>
+                <a:defRPr/>
+              </a:pPr>
               <a:t>‹#›</a:t>
             </a:fld>
             <a:endParaRPr lang="en-US"/>
@@ -2536,7 +2844,7 @@
 </file>
 
 <file path=ppt/slideMasters/slideMaster1.xml><?xml version="1.0" encoding="utf-8"?>
-<p:sldMaster xmlns:a="http://schemas.openxmlformats.org/drawingml/2006/main" xmlns:r="http://schemas.openxmlformats.org/officeDocument/2006/relationships" xmlns:mc="http://schemas.openxmlformats.org/markup-compatibility/2006" xmlns:mv="urn:schemas-microsoft-com:mac:vml" xmlns:p="http://schemas.openxmlformats.org/presentationml/2006/main" mc:Ignorable="mv" mc:PreserveAttributes="mv:*">
+<p:sldMaster xmlns:a="http://schemas.openxmlformats.org/drawingml/2006/main" xmlns:r="http://schemas.openxmlformats.org/officeDocument/2006/relationships" xmlns:p="http://schemas.openxmlformats.org/presentationml/2006/main">
   <p:cSld>
     <p:bg>
       <p:bgRef idx="1001">
@@ -2559,7 +2867,7 @@
       </p:grpSpPr>
       <p:sp>
         <p:nvSpPr>
-          <p:cNvPr id="2" name="Title Placeholder 1"/>
+          <p:cNvPr id="1026" name="Title Placeholder 1"/>
           <p:cNvSpPr>
             <a:spLocks noGrp="1"/>
           </p:cNvSpPr>
@@ -2567,7 +2875,7 @@
             <p:ph type="title"/>
           </p:nvPr>
         </p:nvSpPr>
-        <p:spPr>
+        <p:spPr bwMode="auto">
           <a:xfrm>
             <a:off x="457200" y="274638"/>
             <a:ext cx="8229600" cy="1143000"/>
@@ -2575,24 +2883,33 @@
           <a:prstGeom prst="rect">
             <a:avLst/>
           </a:prstGeom>
+          <a:noFill/>
+          <a:ln w="9525">
+            <a:noFill/>
+            <a:miter lim="800000"/>
+            <a:headEnd/>
+            <a:tailEnd/>
+          </a:ln>
         </p:spPr>
         <p:txBody>
-          <a:bodyPr vert="horz" lIns="91440" tIns="45720" rIns="91440" bIns="45720" rtlCol="0" anchor="ctr">
-            <a:normAutofit/>
+          <a:bodyPr vert="horz" wrap="square" lIns="91440" tIns="45720" rIns="91440" bIns="45720" numCol="1" anchor="ctr" anchorCtr="0" compatLnSpc="1">
+            <a:prstTxWarp prst="textNoShape">
+              <a:avLst/>
+            </a:prstTxWarp>
           </a:bodyPr>
           <a:lstStyle/>
           <a:p>
+            <a:pPr lvl="0"/>
             <a:r>
               <a:rPr lang="en-US" smtClean="0"/>
               <a:t>Click to edit Master title style</a:t>
             </a:r>
-            <a:endParaRPr lang="en-US"/>
-          </a:p>
-        </p:txBody>
-      </p:sp>
-      <p:sp>
-        <p:nvSpPr>
-          <p:cNvPr id="3" name="Text Placeholder 2"/>
+          </a:p>
+        </p:txBody>
+      </p:sp>
+      <p:sp>
+        <p:nvSpPr>
+          <p:cNvPr id="1027" name="Text Placeholder 2"/>
           <p:cNvSpPr>
             <a:spLocks noGrp="1"/>
           </p:cNvSpPr>
@@ -2600,7 +2917,7 @@
             <p:ph type="body" idx="1"/>
           </p:nvPr>
         </p:nvSpPr>
-        <p:spPr>
+        <p:spPr bwMode="auto">
           <a:xfrm>
             <a:off x="457200" y="1600200"/>
             <a:ext cx="8229600" cy="4525963"/>
@@ -2608,10 +2925,19 @@
           <a:prstGeom prst="rect">
             <a:avLst/>
           </a:prstGeom>
+          <a:noFill/>
+          <a:ln w="9525">
+            <a:noFill/>
+            <a:miter lim="800000"/>
+            <a:headEnd/>
+            <a:tailEnd/>
+          </a:ln>
         </p:spPr>
         <p:txBody>
-          <a:bodyPr vert="horz" lIns="91440" tIns="45720" rIns="91440" bIns="45720" rtlCol="0">
-            <a:normAutofit/>
+          <a:bodyPr vert="horz" wrap="square" lIns="91440" tIns="45720" rIns="91440" bIns="45720" numCol="1" anchor="t" anchorCtr="0" compatLnSpc="1">
+            <a:prstTxWarp prst="textNoShape">
+              <a:avLst/>
+            </a:prstTxWarp>
           </a:bodyPr>
           <a:lstStyle/>
           <a:p>
@@ -2648,7 +2974,6 @@
               <a:rPr lang="en-US" smtClean="0"/>
               <a:t>Fifth level</a:t>
             </a:r>
-            <a:endParaRPr lang="en-US"/>
           </a:p>
         </p:txBody>
       </p:sp>
@@ -2674,21 +2999,34 @@
         <p:txBody>
           <a:bodyPr vert="horz" lIns="91440" tIns="45720" rIns="91440" bIns="45720" rtlCol="0" anchor="ctr"/>
           <a:lstStyle>
-            <a:lvl1pPr algn="l">
-              <a:defRPr sz="1200">
+            <a:lvl1pPr algn="l" fontAlgn="auto">
+              <a:spcBef>
+                <a:spcPts val="0"/>
+              </a:spcBef>
+              <a:spcAft>
+                <a:spcPts val="0"/>
+              </a:spcAft>
+              <a:defRPr sz="1200" smtClean="0">
                 <a:solidFill>
                   <a:schemeClr val="tx1">
                     <a:tint val="75000"/>
                   </a:schemeClr>
                 </a:solidFill>
+                <a:latin typeface="+mn-lt"/>
+                <a:cs typeface="+mn-cs"/>
               </a:defRPr>
             </a:lvl1pPr>
           </a:lstStyle>
           <a:p>
-            <a:fld id="{3D7BA643-B6E4-5F47-8F97-5B8A5CDFA610}" type="datetimeFigureOut">
-              <a:rPr lang="en-US" smtClean="0"/>
-              <a:pPr/>
-              <a:t>4/20/11</a:t>
+            <a:pPr>
+              <a:defRPr/>
+            </a:pPr>
+            <a:fld id="{C9FC5877-4CBE-4B17-98AB-9E42DBA7CE96}" type="datetimeFigureOut">
+              <a:rPr lang="en-US"/>
+              <a:pPr>
+                <a:defRPr/>
+              </a:pPr>
+              <a:t>6/15/2012</a:t>
             </a:fld>
             <a:endParaRPr lang="en-US"/>
           </a:p>
@@ -2716,17 +3054,28 @@
         <p:txBody>
           <a:bodyPr vert="horz" lIns="91440" tIns="45720" rIns="91440" bIns="45720" rtlCol="0" anchor="ctr"/>
           <a:lstStyle>
-            <a:lvl1pPr algn="ctr">
+            <a:lvl1pPr algn="ctr" fontAlgn="auto">
+              <a:spcBef>
+                <a:spcPts val="0"/>
+              </a:spcBef>
+              <a:spcAft>
+                <a:spcPts val="0"/>
+              </a:spcAft>
               <a:defRPr sz="1200">
                 <a:solidFill>
                   <a:schemeClr val="tx1">
                     <a:tint val="75000"/>
                   </a:schemeClr>
                 </a:solidFill>
+                <a:latin typeface="+mn-lt"/>
+                <a:cs typeface="+mn-cs"/>
               </a:defRPr>
             </a:lvl1pPr>
           </a:lstStyle>
           <a:p>
+            <a:pPr>
+              <a:defRPr/>
+            </a:pPr>
             <a:endParaRPr lang="en-US"/>
           </a:p>
         </p:txBody>
@@ -2753,20 +3102,33 @@
         <p:txBody>
           <a:bodyPr vert="horz" lIns="91440" tIns="45720" rIns="91440" bIns="45720" rtlCol="0" anchor="ctr"/>
           <a:lstStyle>
-            <a:lvl1pPr algn="r">
-              <a:defRPr sz="1200">
+            <a:lvl1pPr algn="r" fontAlgn="auto">
+              <a:spcBef>
+                <a:spcPts val="0"/>
+              </a:spcBef>
+              <a:spcAft>
+                <a:spcPts val="0"/>
+              </a:spcAft>
+              <a:defRPr sz="1200" smtClean="0">
                 <a:solidFill>
                   <a:schemeClr val="tx1">
                     <a:tint val="75000"/>
                   </a:schemeClr>
                 </a:solidFill>
+                <a:latin typeface="+mn-lt"/>
+                <a:cs typeface="+mn-cs"/>
               </a:defRPr>
             </a:lvl1pPr>
           </a:lstStyle>
           <a:p>
-            <a:fld id="{B6D880B0-D896-B448-AD62-E3A08F4BBC35}" type="slidenum">
-              <a:rPr lang="en-US" smtClean="0"/>
-              <a:pPr/>
+            <a:pPr>
+              <a:defRPr/>
+            </a:pPr>
+            <a:fld id="{E6D286BA-44B6-4A42-BDF0-F94BE7CCAE2D}" type="slidenum">
+              <a:rPr lang="en-US"/>
+              <a:pPr>
+                <a:defRPr/>
+              </a:pPr>
               <a:t>‹#›</a:t>
             </a:fld>
             <a:endParaRPr lang="en-US"/>
@@ -2777,25 +3139,27 @@
   </p:cSld>
   <p:clrMap bg1="lt1" tx1="dk1" bg2="lt2" tx2="dk2" accent1="accent1" accent2="accent2" accent3="accent3" accent4="accent4" accent5="accent5" accent6="accent6" hlink="hlink" folHlink="folHlink"/>
   <p:sldLayoutIdLst>
-    <p:sldLayoutId id="2147483649" r:id="rId1"/>
-    <p:sldLayoutId id="2147483650" r:id="rId2"/>
-    <p:sldLayoutId id="2147483651" r:id="rId3"/>
-    <p:sldLayoutId id="2147483652" r:id="rId4"/>
-    <p:sldLayoutId id="2147483653" r:id="rId5"/>
+    <p:sldLayoutId id="2147483659" r:id="rId1"/>
+    <p:sldLayoutId id="2147483658" r:id="rId2"/>
+    <p:sldLayoutId id="2147483657" r:id="rId3"/>
+    <p:sldLayoutId id="2147483656" r:id="rId4"/>
+    <p:sldLayoutId id="2147483655" r:id="rId5"/>
     <p:sldLayoutId id="2147483654" r:id="rId6"/>
-    <p:sldLayoutId id="2147483655" r:id="rId7"/>
-    <p:sldLayoutId id="2147483656" r:id="rId8"/>
-    <p:sldLayoutId id="2147483657" r:id="rId9"/>
-    <p:sldLayoutId id="2147483658" r:id="rId10"/>
-    <p:sldLayoutId id="2147483659" r:id="rId11"/>
+    <p:sldLayoutId id="2147483653" r:id="rId7"/>
+    <p:sldLayoutId id="2147483652" r:id="rId8"/>
+    <p:sldLayoutId id="2147483651" r:id="rId9"/>
+    <p:sldLayoutId id="2147483650" r:id="rId10"/>
+    <p:sldLayoutId id="2147483649" r:id="rId11"/>
   </p:sldLayoutIdLst>
   <p:txStyles>
     <p:titleStyle>
-      <a:lvl1pPr algn="ctr" defTabSz="457200" rtl="0" eaLnBrk="1" latinLnBrk="0" hangingPunct="1">
+      <a:lvl1pPr algn="ctr" defTabSz="457200" rtl="0" fontAlgn="base">
         <a:spcBef>
           <a:spcPct val="0"/>
         </a:spcBef>
-        <a:buNone/>
+        <a:spcAft>
+          <a:spcPct val="0"/>
+        </a:spcAft>
         <a:defRPr sz="4400" kern="1200">
           <a:solidFill>
             <a:schemeClr val="tx1"/>
@@ -2805,13 +3169,128 @@
           <a:cs typeface="+mj-cs"/>
         </a:defRPr>
       </a:lvl1pPr>
+      <a:lvl2pPr algn="ctr" defTabSz="457200" rtl="0" fontAlgn="base">
+        <a:spcBef>
+          <a:spcPct val="0"/>
+        </a:spcBef>
+        <a:spcAft>
+          <a:spcPct val="0"/>
+        </a:spcAft>
+        <a:defRPr sz="4400">
+          <a:solidFill>
+            <a:schemeClr val="tx1"/>
+          </a:solidFill>
+          <a:latin typeface="Calibri" pitchFamily="34" charset="0"/>
+        </a:defRPr>
+      </a:lvl2pPr>
+      <a:lvl3pPr algn="ctr" defTabSz="457200" rtl="0" fontAlgn="base">
+        <a:spcBef>
+          <a:spcPct val="0"/>
+        </a:spcBef>
+        <a:spcAft>
+          <a:spcPct val="0"/>
+        </a:spcAft>
+        <a:defRPr sz="4400">
+          <a:solidFill>
+            <a:schemeClr val="tx1"/>
+          </a:solidFill>
+          <a:latin typeface="Calibri" pitchFamily="34" charset="0"/>
+        </a:defRPr>
+      </a:lvl3pPr>
+      <a:lvl4pPr algn="ctr" defTabSz="457200" rtl="0" fontAlgn="base">
+        <a:spcBef>
+          <a:spcPct val="0"/>
+        </a:spcBef>
+        <a:spcAft>
+          <a:spcPct val="0"/>
+        </a:spcAft>
+        <a:defRPr sz="4400">
+          <a:solidFill>
+            <a:schemeClr val="tx1"/>
+          </a:solidFill>
+          <a:latin typeface="Calibri" pitchFamily="34" charset="0"/>
+        </a:defRPr>
+      </a:lvl4pPr>
+      <a:lvl5pPr algn="ctr" defTabSz="457200" rtl="0" fontAlgn="base">
+        <a:spcBef>
+          <a:spcPct val="0"/>
+        </a:spcBef>
+        <a:spcAft>
+          <a:spcPct val="0"/>
+        </a:spcAft>
+        <a:defRPr sz="4400">
+          <a:solidFill>
+            <a:schemeClr val="tx1"/>
+          </a:solidFill>
+          <a:latin typeface="Calibri" pitchFamily="34" charset="0"/>
+        </a:defRPr>
+      </a:lvl5pPr>
+      <a:lvl6pPr marL="457200" algn="ctr" defTabSz="457200" rtl="0" fontAlgn="base">
+        <a:spcBef>
+          <a:spcPct val="0"/>
+        </a:spcBef>
+        <a:spcAft>
+          <a:spcPct val="0"/>
+        </a:spcAft>
+        <a:defRPr sz="4400">
+          <a:solidFill>
+            <a:schemeClr val="tx1"/>
+          </a:solidFill>
+          <a:latin typeface="Calibri" pitchFamily="34" charset="0"/>
+        </a:defRPr>
+      </a:lvl6pPr>
+      <a:lvl7pPr marL="914400" algn="ctr" defTabSz="457200" rtl="0" fontAlgn="base">
+        <a:spcBef>
+          <a:spcPct val="0"/>
+        </a:spcBef>
+        <a:spcAft>
+          <a:spcPct val="0"/>
+        </a:spcAft>
+        <a:defRPr sz="4400">
+          <a:solidFill>
+            <a:schemeClr val="tx1"/>
+          </a:solidFill>
+          <a:latin typeface="Calibri" pitchFamily="34" charset="0"/>
+        </a:defRPr>
+      </a:lvl7pPr>
+      <a:lvl8pPr marL="1371600" algn="ctr" defTabSz="457200" rtl="0" fontAlgn="base">
+        <a:spcBef>
+          <a:spcPct val="0"/>
+        </a:spcBef>
+        <a:spcAft>
+          <a:spcPct val="0"/>
+        </a:spcAft>
+        <a:defRPr sz="4400">
+          <a:solidFill>
+            <a:schemeClr val="tx1"/>
+          </a:solidFill>
+          <a:latin typeface="Calibri" pitchFamily="34" charset="0"/>
+        </a:defRPr>
+      </a:lvl8pPr>
+      <a:lvl9pPr marL="1828800" algn="ctr" defTabSz="457200" rtl="0" fontAlgn="base">
+        <a:spcBef>
+          <a:spcPct val="0"/>
+        </a:spcBef>
+        <a:spcAft>
+          <a:spcPct val="0"/>
+        </a:spcAft>
+        <a:defRPr sz="4400">
+          <a:solidFill>
+            <a:schemeClr val="tx1"/>
+          </a:solidFill>
+          <a:latin typeface="Calibri" pitchFamily="34" charset="0"/>
+        </a:defRPr>
+      </a:lvl9pPr>
     </p:titleStyle>
     <p:bodyStyle>
-      <a:lvl1pPr marL="342900" indent="-342900" algn="l" defTabSz="457200" rtl="0" eaLnBrk="1" latinLnBrk="0" hangingPunct="1">
+      <a:lvl1pPr marL="342900" indent="-342900" algn="l" defTabSz="457200" rtl="0" fontAlgn="base">
         <a:spcBef>
           <a:spcPct val="20000"/>
         </a:spcBef>
-        <a:buFont typeface="Arial"/>
+        <a:spcAft>
+          <a:spcPct val="0"/>
+        </a:spcAft>
+        <a:buFont typeface="Arial" charset="0"/>
         <a:buChar char="•"/>
         <a:defRPr sz="3200" kern="1200">
           <a:solidFill>
@@ -2822,11 +3301,14 @@
           <a:cs typeface="+mn-cs"/>
         </a:defRPr>
       </a:lvl1pPr>
-      <a:lvl2pPr marL="742950" indent="-285750" algn="l" defTabSz="457200" rtl="0" eaLnBrk="1" latinLnBrk="0" hangingPunct="1">
+      <a:lvl2pPr marL="742950" indent="-285750" algn="l" defTabSz="457200" rtl="0" fontAlgn="base">
         <a:spcBef>
           <a:spcPct val="20000"/>
         </a:spcBef>
-        <a:buFont typeface="Arial"/>
+        <a:spcAft>
+          <a:spcPct val="0"/>
+        </a:spcAft>
+        <a:buFont typeface="Arial" charset="0"/>
         <a:buChar char="–"/>
         <a:defRPr sz="2800" kern="1200">
           <a:solidFill>
@@ -2837,11 +3319,14 @@
           <a:cs typeface="+mn-cs"/>
         </a:defRPr>
       </a:lvl2pPr>
-      <a:lvl3pPr marL="1143000" indent="-228600" algn="l" defTabSz="457200" rtl="0" eaLnBrk="1" latinLnBrk="0" hangingPunct="1">
+      <a:lvl3pPr marL="1143000" indent="-228600" algn="l" defTabSz="457200" rtl="0" fontAlgn="base">
         <a:spcBef>
           <a:spcPct val="20000"/>
         </a:spcBef>
-        <a:buFont typeface="Arial"/>
+        <a:spcAft>
+          <a:spcPct val="0"/>
+        </a:spcAft>
+        <a:buFont typeface="Arial" charset="0"/>
         <a:buChar char="•"/>
         <a:defRPr sz="2400" kern="1200">
           <a:solidFill>
@@ -2852,11 +3337,14 @@
           <a:cs typeface="+mn-cs"/>
         </a:defRPr>
       </a:lvl3pPr>
-      <a:lvl4pPr marL="1600200" indent="-228600" algn="l" defTabSz="457200" rtl="0" eaLnBrk="1" latinLnBrk="0" hangingPunct="1">
+      <a:lvl4pPr marL="1600200" indent="-228600" algn="l" defTabSz="457200" rtl="0" fontAlgn="base">
         <a:spcBef>
           <a:spcPct val="20000"/>
         </a:spcBef>
-        <a:buFont typeface="Arial"/>
+        <a:spcAft>
+          <a:spcPct val="0"/>
+        </a:spcAft>
+        <a:buFont typeface="Arial" charset="0"/>
         <a:buChar char="–"/>
         <a:defRPr sz="2000" kern="1200">
           <a:solidFill>
@@ -2867,11 +3355,14 @@
           <a:cs typeface="+mn-cs"/>
         </a:defRPr>
       </a:lvl4pPr>
-      <a:lvl5pPr marL="2057400" indent="-228600" algn="l" defTabSz="457200" rtl="0" eaLnBrk="1" latinLnBrk="0" hangingPunct="1">
+      <a:lvl5pPr marL="2057400" indent="-228600" algn="l" defTabSz="457200" rtl="0" fontAlgn="base">
         <a:spcBef>
           <a:spcPct val="20000"/>
         </a:spcBef>
-        <a:buFont typeface="Arial"/>
+        <a:spcAft>
+          <a:spcPct val="0"/>
+        </a:spcAft>
+        <a:buFont typeface="Arial" charset="0"/>
         <a:buChar char="»"/>
         <a:defRPr sz="2000" kern="1200">
           <a:solidFill>
@@ -3043,7 +3534,7 @@
 </file>
 
 <file path=ppt/slides/slide1.xml><?xml version="1.0" encoding="utf-8"?>
-<p:sld xmlns:a="http://schemas.openxmlformats.org/drawingml/2006/main" xmlns:r="http://schemas.openxmlformats.org/officeDocument/2006/relationships" xmlns:mc="http://schemas.openxmlformats.org/markup-compatibility/2006" xmlns:mv="urn:schemas-microsoft-com:mac:vml" xmlns:p="http://schemas.openxmlformats.org/presentationml/2006/main" mc:Ignorable="mv" mc:PreserveAttributes="mv:*">
+<p:sld xmlns:a="http://schemas.openxmlformats.org/drawingml/2006/main" xmlns:r="http://schemas.openxmlformats.org/officeDocument/2006/relationships" xmlns:p="http://schemas.openxmlformats.org/presentationml/2006/main">
   <p:cSld>
     <p:spTree>
       <p:nvGrpSpPr>
@@ -3067,8 +3558,8 @@
         </p:nvSpPr>
         <p:spPr>
           <a:xfrm>
-            <a:off x="3195710" y="2809495"/>
-            <a:ext cx="2022813" cy="853588"/>
+            <a:off x="3195638" y="2809875"/>
+            <a:ext cx="2022475" cy="852488"/>
           </a:xfrm>
           <a:prstGeom prst="pentagon">
             <a:avLst/>
@@ -3095,10 +3586,18 @@
           </a:fontRef>
         </p:style>
         <p:txBody>
-          <a:bodyPr rtlCol="0" anchor="ctr"/>
+          <a:bodyPr anchor="ctr"/>
           <a:lstStyle/>
           <a:p>
-            <a:pPr algn="ctr"/>
+            <a:pPr algn="ctr" fontAlgn="auto">
+              <a:spcBef>
+                <a:spcPts val="0"/>
+              </a:spcBef>
+              <a:spcAft>
+                <a:spcPts val="0"/>
+              </a:spcAft>
+              <a:defRPr/>
+            </a:pPr>
             <a:endParaRPr lang="en-US" sz="1400"/>
           </a:p>
         </p:txBody>
@@ -3113,8 +3612,8 @@
         </p:nvCxnSpPr>
         <p:spPr>
           <a:xfrm rot="16200000" flipH="1">
-            <a:off x="3843461" y="2445839"/>
-            <a:ext cx="726520" cy="792"/>
+            <a:off x="3843337" y="2446338"/>
+            <a:ext cx="727075" cy="0"/>
           </a:xfrm>
           <a:prstGeom prst="straightConnector1">
             <a:avLst/>
@@ -3149,8 +3648,8 @@
         </p:nvCxnSpPr>
         <p:spPr>
           <a:xfrm rot="16200000" flipH="1">
-            <a:off x="3850000" y="3999764"/>
-            <a:ext cx="693005" cy="19642"/>
+            <a:off x="3849688" y="3998913"/>
+            <a:ext cx="693737" cy="20637"/>
           </a:xfrm>
           <a:prstGeom prst="straightConnector1">
             <a:avLst/>
@@ -3179,132 +3678,165 @@
       </p:cxnSp>
       <p:sp>
         <p:nvSpPr>
-          <p:cNvPr id="14" name="TextBox 13"/>
-          <p:cNvSpPr txBox="1"/>
+          <p:cNvPr id="13316" name="TextBox 13"/>
+          <p:cNvSpPr txBox="1">
+            <a:spLocks noChangeArrowheads="1"/>
+          </p:cNvSpPr>
           <p:nvPr/>
         </p:nvSpPr>
-        <p:spPr>
+        <p:spPr bwMode="auto">
           <a:xfrm>
-            <a:off x="4403593" y="2308598"/>
-            <a:ext cx="684803" cy="307777"/>
+            <a:off x="4191000" y="2308225"/>
+            <a:ext cx="409575" cy="304800"/>
           </a:xfrm>
           <a:prstGeom prst="rect">
             <a:avLst/>
           </a:prstGeom>
           <a:noFill/>
+          <a:ln w="9525">
+            <a:noFill/>
+            <a:miter lim="800000"/>
+            <a:headEnd/>
+            <a:tailEnd/>
+          </a:ln>
         </p:spPr>
         <p:txBody>
-          <a:bodyPr wrap="none" rtlCol="0">
+          <a:bodyPr wrap="none">
             <a:spAutoFit/>
           </a:bodyPr>
           <a:lstStyle/>
           <a:p>
             <a:r>
-              <a:rPr lang="en-US" sz="1400" dirty="0" smtClean="0"/>
-              <a:t>75,000</a:t>
-            </a:r>
-            <a:endParaRPr lang="en-US" sz="1400" dirty="0"/>
-          </a:p>
-        </p:txBody>
-      </p:sp>
-      <p:sp>
-        <p:nvSpPr>
-          <p:cNvPr id="15" name="TextBox 14"/>
-          <p:cNvSpPr txBox="1"/>
+              <a:rPr lang="en-US" sz="1400">
+                <a:latin typeface="Calibri" pitchFamily="34" charset="0"/>
+              </a:rPr>
+              <a:t>.75</a:t>
+            </a:r>
+          </a:p>
+        </p:txBody>
+      </p:sp>
+      <p:sp>
+        <p:nvSpPr>
+          <p:cNvPr id="13317" name="TextBox 14"/>
+          <p:cNvSpPr txBox="1">
+            <a:spLocks noChangeArrowheads="1"/>
+          </p:cNvSpPr>
           <p:nvPr/>
         </p:nvSpPr>
-        <p:spPr>
+        <p:spPr bwMode="auto">
           <a:xfrm>
-            <a:off x="4206323" y="3724638"/>
-            <a:ext cx="505267" cy="307777"/>
+            <a:off x="4206875" y="3724275"/>
+            <a:ext cx="504825" cy="307975"/>
           </a:xfrm>
           <a:prstGeom prst="rect">
             <a:avLst/>
           </a:prstGeom>
           <a:noFill/>
+          <a:ln w="9525">
+            <a:noFill/>
+            <a:miter lim="800000"/>
+            <a:headEnd/>
+            <a:tailEnd/>
+          </a:ln>
         </p:spPr>
         <p:txBody>
-          <a:bodyPr wrap="none" rtlCol="0">
+          <a:bodyPr wrap="none">
             <a:spAutoFit/>
           </a:bodyPr>
           <a:lstStyle/>
           <a:p>
             <a:r>
-              <a:rPr lang="en-US" sz="1400" dirty="0" smtClean="0"/>
+              <a:rPr lang="en-US" sz="1400">
+                <a:latin typeface="Calibri" pitchFamily="34" charset="0"/>
+              </a:rPr>
               <a:t>5.33</a:t>
             </a:r>
-            <a:endParaRPr lang="en-US" sz="1400" dirty="0"/>
-          </a:p>
-        </p:txBody>
-      </p:sp>
-      <p:sp>
-        <p:nvSpPr>
-          <p:cNvPr id="16" name="TextBox 15"/>
-          <p:cNvSpPr txBox="1"/>
+          </a:p>
+        </p:txBody>
+      </p:sp>
+      <p:sp>
+        <p:nvSpPr>
+          <p:cNvPr id="13318" name="TextBox 15"/>
+          <p:cNvSpPr txBox="1">
+            <a:spLocks noChangeArrowheads="1"/>
+          </p:cNvSpPr>
           <p:nvPr/>
         </p:nvSpPr>
-        <p:spPr>
+        <p:spPr bwMode="auto">
           <a:xfrm>
-            <a:off x="5398312" y="2975791"/>
-            <a:ext cx="2922207" cy="369332"/>
+            <a:off x="5399088" y="2976563"/>
+            <a:ext cx="2495550" cy="366712"/>
           </a:xfrm>
           <a:prstGeom prst="rect">
             <a:avLst/>
           </a:prstGeom>
           <a:noFill/>
+          <a:ln w="9525">
+            <a:noFill/>
+            <a:miter lim="800000"/>
+            <a:headEnd/>
+            <a:tailEnd/>
+          </a:ln>
         </p:spPr>
         <p:txBody>
-          <a:bodyPr wrap="none" rtlCol="0">
+          <a:bodyPr wrap="none">
             <a:spAutoFit/>
           </a:bodyPr>
           <a:lstStyle/>
           <a:p>
             <a:r>
-              <a:rPr lang="en-US" i="1" dirty="0" smtClean="0"/>
-              <a:t>5.34MB reduced to 4.387MB</a:t>
-            </a:r>
-            <a:endParaRPr lang="en-US" i="1" dirty="0"/>
-          </a:p>
-        </p:txBody>
-      </p:sp>
-      <p:sp>
-        <p:nvSpPr>
-          <p:cNvPr id="19" name="TextBox 18"/>
-          <p:cNvSpPr txBox="1"/>
+              <a:rPr lang="en-US" i="1">
+                <a:latin typeface="Calibri" pitchFamily="34" charset="0"/>
+              </a:rPr>
+              <a:t>5.3MB reduced to 4.4MB</a:t>
+            </a:r>
+          </a:p>
+        </p:txBody>
+      </p:sp>
+      <p:sp>
+        <p:nvSpPr>
+          <p:cNvPr id="13319" name="TextBox 18"/>
+          <p:cNvSpPr txBox="1">
+            <a:spLocks noChangeArrowheads="1"/>
+          </p:cNvSpPr>
           <p:nvPr/>
         </p:nvSpPr>
-        <p:spPr>
+        <p:spPr bwMode="auto">
           <a:xfrm>
-            <a:off x="3433513" y="2914236"/>
-            <a:ext cx="1654883" cy="523220"/>
+            <a:off x="3433763" y="2914650"/>
+            <a:ext cx="1416050" cy="517525"/>
           </a:xfrm>
           <a:prstGeom prst="rect">
             <a:avLst/>
           </a:prstGeom>
           <a:noFill/>
+          <a:ln w="9525">
+            <a:noFill/>
+            <a:miter lim="800000"/>
+            <a:headEnd/>
+            <a:tailEnd/>
+          </a:ln>
         </p:spPr>
         <p:txBody>
-          <a:bodyPr wrap="none" rtlCol="0">
+          <a:bodyPr wrap="none">
             <a:spAutoFit/>
           </a:bodyPr>
           <a:lstStyle/>
           <a:p>
             <a:r>
-              <a:rPr lang="en-US" sz="1400" dirty="0" smtClean="0"/>
-              <a:t>         </a:t>
-            </a:r>
-            <a:r>
-              <a:rPr lang="en-US" sz="1400" dirty="0" err="1" smtClean="0"/>
-              <a:t>ArrayList</a:t>
-            </a:r>
-            <a:endParaRPr lang="en-US" sz="1400" dirty="0" smtClean="0"/>
-          </a:p>
-          <a:p>
-            <a:r>
-              <a:rPr lang="en-US" sz="1400" i="1" dirty="0" smtClean="0"/>
-              <a:t>X75,000 = 4.387MB</a:t>
-            </a:r>
-            <a:endParaRPr lang="en-US" sz="1400" i="1" dirty="0"/>
+              <a:rPr lang="en-US" sz="1400">
+                <a:latin typeface="Calibri" pitchFamily="34" charset="0"/>
+              </a:rPr>
+              <a:t>         ArrayList</a:t>
+            </a:r>
+          </a:p>
+          <a:p>
+            <a:r>
+              <a:rPr lang="en-US" sz="1400" i="1">
+                <a:latin typeface="Calibri" pitchFamily="34" charset="0"/>
+              </a:rPr>
+              <a:t>X75,000 = 4.4MB</a:t>
+            </a:r>
           </a:p>
         </p:txBody>
       </p:sp>
@@ -3316,8 +3848,8 @@
         </p:nvSpPr>
         <p:spPr>
           <a:xfrm>
-            <a:off x="3454123" y="4402255"/>
-            <a:ext cx="1721327" cy="593704"/>
+            <a:off x="3454400" y="4402138"/>
+            <a:ext cx="1720850" cy="593725"/>
           </a:xfrm>
           <a:prstGeom prst="rect">
             <a:avLst/>
@@ -3344,87 +3876,119 @@
           </a:fontRef>
         </p:style>
         <p:txBody>
-          <a:bodyPr rtlCol="0" anchor="ctr"/>
+          <a:bodyPr anchor="ctr"/>
           <a:lstStyle/>
           <a:p>
-            <a:pPr algn="ctr"/>
+            <a:pPr algn="ctr" fontAlgn="auto">
+              <a:spcBef>
+                <a:spcPts val="0"/>
+              </a:spcBef>
+              <a:spcAft>
+                <a:spcPts val="0"/>
+              </a:spcAft>
+              <a:defRPr/>
+            </a:pPr>
             <a:endParaRPr lang="en-US" sz="1400"/>
           </a:p>
         </p:txBody>
       </p:sp>
       <p:sp>
         <p:nvSpPr>
-          <p:cNvPr id="27" name="TextBox 26"/>
-          <p:cNvSpPr txBox="1"/>
+          <p:cNvPr id="13321" name="TextBox 26"/>
+          <p:cNvSpPr txBox="1">
+            <a:spLocks noChangeArrowheads="1"/>
+          </p:cNvSpPr>
           <p:nvPr/>
         </p:nvSpPr>
-        <p:spPr>
+        <p:spPr bwMode="auto">
           <a:xfrm>
-            <a:off x="3433513" y="4402255"/>
-            <a:ext cx="1343311" cy="523220"/>
+            <a:off x="3433763" y="4402138"/>
+            <a:ext cx="1343025" cy="523875"/>
           </a:xfrm>
           <a:prstGeom prst="rect">
             <a:avLst/>
           </a:prstGeom>
           <a:noFill/>
+          <a:ln w="9525">
+            <a:noFill/>
+            <a:miter lim="800000"/>
+            <a:headEnd/>
+            <a:tailEnd/>
+          </a:ln>
         </p:spPr>
         <p:txBody>
-          <a:bodyPr wrap="none" rtlCol="0">
+          <a:bodyPr wrap="none">
             <a:spAutoFit/>
           </a:bodyPr>
           <a:lstStyle/>
           <a:p>
             <a:r>
-              <a:rPr lang="en-US" sz="1400" dirty="0" smtClean="0"/>
+              <a:rPr lang="en-US" sz="1400">
+                <a:latin typeface="Calibri" pitchFamily="34" charset="0"/>
+              </a:rPr>
               <a:t>            Supplier</a:t>
             </a:r>
           </a:p>
           <a:p>
             <a:r>
-              <a:rPr lang="en-US" sz="1400" i="1" dirty="0" smtClean="0"/>
+              <a:rPr lang="en-US" sz="1400" i="1">
+                <a:latin typeface="Calibri" pitchFamily="34" charset="0"/>
+              </a:rPr>
               <a:t>           x400,000 </a:t>
             </a:r>
-            <a:endParaRPr lang="en-US" sz="1400" i="1" dirty="0"/>
-          </a:p>
-        </p:txBody>
-      </p:sp>
-      <p:sp>
-        <p:nvSpPr>
-          <p:cNvPr id="30" name="TextBox 29"/>
-          <p:cNvSpPr txBox="1"/>
+          </a:p>
+        </p:txBody>
+      </p:sp>
+      <p:sp>
+        <p:nvSpPr>
+          <p:cNvPr id="13322" name="TextBox 29"/>
+          <p:cNvSpPr txBox="1">
+            <a:spLocks noChangeArrowheads="1"/>
+          </p:cNvSpPr>
           <p:nvPr/>
         </p:nvSpPr>
-        <p:spPr>
+        <p:spPr bwMode="auto">
           <a:xfrm>
-            <a:off x="3508616" y="1489271"/>
-            <a:ext cx="1202974" cy="523220"/>
+            <a:off x="3508375" y="1489075"/>
+            <a:ext cx="1203325" cy="523875"/>
           </a:xfrm>
           <a:prstGeom prst="rect">
             <a:avLst/>
           </a:prstGeom>
           <a:noFill/>
+          <a:ln w="9525">
+            <a:noFill/>
+            <a:miter lim="800000"/>
+            <a:headEnd/>
+            <a:tailEnd/>
+          </a:ln>
         </p:spPr>
         <p:txBody>
-          <a:bodyPr wrap="none" rtlCol="0">
+          <a:bodyPr wrap="none">
             <a:spAutoFit/>
           </a:bodyPr>
           <a:lstStyle/>
           <a:p>
             <a:r>
-              <a:rPr lang="en-US" sz="1400" dirty="0" smtClean="0"/>
+              <a:rPr lang="en-US" sz="1400">
+                <a:latin typeface="Calibri" pitchFamily="34" charset="0"/>
+              </a:rPr>
               <a:t>         Product</a:t>
             </a:r>
           </a:p>
           <a:p>
             <a:r>
-              <a:rPr lang="en-US" sz="1400" dirty="0" smtClean="0"/>
+              <a:rPr lang="en-US" sz="1400">
+                <a:latin typeface="Calibri" pitchFamily="34" charset="0"/>
+              </a:rPr>
               <a:t>        x</a:t>
             </a:r>
             <a:r>
-              <a:rPr lang="en-US" sz="1400" i="1" dirty="0" smtClean="0"/>
+              <a:rPr lang="en-US" sz="1400" i="1">
+                <a:latin typeface="Calibri" pitchFamily="34" charset="0"/>
+              </a:rPr>
               <a:t>100,000 </a:t>
             </a:r>
-            <a:endParaRPr lang="en-US" sz="1400" i="1" dirty="0"/>
           </a:p>
         </p:txBody>
       </p:sp>
@@ -3436,8 +4000,8 @@
         </p:nvSpPr>
         <p:spPr>
           <a:xfrm>
-            <a:off x="3251524" y="1489271"/>
-            <a:ext cx="1836872" cy="593704"/>
+            <a:off x="3251200" y="1489075"/>
+            <a:ext cx="1836738" cy="593725"/>
           </a:xfrm>
           <a:prstGeom prst="rect">
             <a:avLst/>
@@ -3464,10 +4028,18 @@
           </a:fontRef>
         </p:style>
         <p:txBody>
-          <a:bodyPr rtlCol="0" anchor="ctr"/>
+          <a:bodyPr anchor="ctr"/>
           <a:lstStyle/>
           <a:p>
-            <a:pPr algn="ctr"/>
+            <a:pPr algn="ctr" fontAlgn="auto">
+              <a:spcBef>
+                <a:spcPts val="0"/>
+              </a:spcBef>
+              <a:spcAft>
+                <a:spcPts val="0"/>
+              </a:spcAft>
+              <a:defRPr/>
+            </a:pPr>
             <a:endParaRPr lang="en-US" sz="1400"/>
           </a:p>
         </p:txBody>

</xml_diff>

<commit_message>
Relationships chapter: fixed EC diagrams.
</commit_message>
<xml_diff>
--- a/part1/Figures/collections/empty-product.pptx
+++ b/part1/Figures/collections/empty-product.pptx
@@ -328,7 +328,7 @@
               <a:pPr>
                 <a:defRPr/>
               </a:pPr>
-              <a:t>6/15/2012</a:t>
+              <a:t>6/19/12</a:t>
             </a:fld>
             <a:endParaRPr lang="en-US"/>
           </a:p>
@@ -520,7 +520,7 @@
               <a:pPr>
                 <a:defRPr/>
               </a:pPr>
-              <a:t>6/15/2012</a:t>
+              <a:t>6/19/12</a:t>
             </a:fld>
             <a:endParaRPr lang="en-US"/>
           </a:p>
@@ -722,7 +722,7 @@
               <a:pPr>
                 <a:defRPr/>
               </a:pPr>
-              <a:t>6/15/2012</a:t>
+              <a:t>6/19/12</a:t>
             </a:fld>
             <a:endParaRPr lang="en-US"/>
           </a:p>
@@ -914,7 +914,7 @@
               <a:pPr>
                 <a:defRPr/>
               </a:pPr>
-              <a:t>6/15/2012</a:t>
+              <a:t>6/19/12</a:t>
             </a:fld>
             <a:endParaRPr lang="en-US"/>
           </a:p>
@@ -1182,7 +1182,7 @@
               <a:pPr>
                 <a:defRPr/>
               </a:pPr>
-              <a:t>6/15/2012</a:t>
+              <a:t>6/19/12</a:t>
             </a:fld>
             <a:endParaRPr lang="en-US"/>
           </a:p>
@@ -1492,7 +1492,7 @@
               <a:pPr>
                 <a:defRPr/>
               </a:pPr>
-              <a:t>6/15/2012</a:t>
+              <a:t>6/19/12</a:t>
             </a:fld>
             <a:endParaRPr lang="en-US"/>
           </a:p>
@@ -1936,7 +1936,7 @@
               <a:pPr>
                 <a:defRPr/>
               </a:pPr>
-              <a:t>6/15/2012</a:t>
+              <a:t>6/19/12</a:t>
             </a:fld>
             <a:endParaRPr lang="en-US"/>
           </a:p>
@@ -2076,7 +2076,7 @@
               <a:pPr>
                 <a:defRPr/>
               </a:pPr>
-              <a:t>6/15/2012</a:t>
+              <a:t>6/19/12</a:t>
             </a:fld>
             <a:endParaRPr lang="en-US"/>
           </a:p>
@@ -2193,7 +2193,7 @@
               <a:pPr>
                 <a:defRPr/>
               </a:pPr>
-              <a:t>6/15/2012</a:t>
+              <a:t>6/19/12</a:t>
             </a:fld>
             <a:endParaRPr lang="en-US"/>
           </a:p>
@@ -2492,7 +2492,7 @@
               <a:pPr>
                 <a:defRPr/>
               </a:pPr>
-              <a:t>6/15/2012</a:t>
+              <a:t>6/19/12</a:t>
             </a:fld>
             <a:endParaRPr lang="en-US"/>
           </a:p>
@@ -2770,7 +2770,7 @@
               <a:pPr>
                 <a:defRPr/>
               </a:pPr>
-              <a:t>6/15/2012</a:t>
+              <a:t>6/19/12</a:t>
             </a:fld>
             <a:endParaRPr lang="en-US"/>
           </a:p>
@@ -3026,7 +3026,7 @@
               <a:pPr>
                 <a:defRPr/>
               </a:pPr>
-              <a:t>6/15/2012</a:t>
+              <a:t>6/19/12</a:t>
             </a:fld>
             <a:endParaRPr lang="en-US"/>
           </a:p>
@@ -3647,9 +3647,9 @@
           <p:nvPr/>
         </p:nvCxnSpPr>
         <p:spPr>
-          <a:xfrm rot="16200000" flipH="1">
-            <a:off x="3849688" y="3998913"/>
-            <a:ext cx="693737" cy="20637"/>
+          <a:xfrm>
+            <a:off x="4186238" y="3662363"/>
+            <a:ext cx="20637" cy="739775"/>
           </a:xfrm>
           <a:prstGeom prst="straightConnector1">
             <a:avLst/>
@@ -3764,7 +3764,7 @@
         </p:nvSpPr>
         <p:spPr bwMode="auto">
           <a:xfrm>
-            <a:off x="5399088" y="2976563"/>
+            <a:off x="5399088" y="3048000"/>
             <a:ext cx="2495550" cy="366712"/>
           </a:xfrm>
           <a:prstGeom prst="rect">
@@ -3785,7 +3785,7 @@
           <a:lstStyle/>
           <a:p>
             <a:r>
-              <a:rPr lang="en-US" i="1">
+              <a:rPr lang="en-US" i="1" dirty="0">
                 <a:latin typeface="Calibri" pitchFamily="34" charset="0"/>
               </a:rPr>
               <a:t>5.3MB reduced to 4.4MB</a:t>
@@ -3803,7 +3803,7 @@
         </p:nvSpPr>
         <p:spPr bwMode="auto">
           <a:xfrm>
-            <a:off x="3433763" y="2914650"/>
+            <a:off x="3433763" y="2987675"/>
             <a:ext cx="1416050" cy="517525"/>
           </a:xfrm>
           <a:prstGeom prst="rect">
@@ -3824,15 +3824,24 @@
           <a:lstStyle/>
           <a:p>
             <a:r>
-              <a:rPr lang="en-US" sz="1400">
+              <a:rPr lang="en-US" sz="1400" dirty="0">
                 <a:latin typeface="Calibri" pitchFamily="34" charset="0"/>
               </a:rPr>
-              <a:t>         ArrayList</a:t>
-            </a:r>
-          </a:p>
-          <a:p>
-            <a:r>
-              <a:rPr lang="en-US" sz="1400" i="1">
+              <a:t>         </a:t>
+            </a:r>
+            <a:r>
+              <a:rPr lang="en-US" sz="1400" dirty="0" err="1">
+                <a:latin typeface="Calibri" pitchFamily="34" charset="0"/>
+              </a:rPr>
+              <a:t>ArrayList</a:t>
+            </a:r>
+            <a:endParaRPr lang="en-US" sz="1400" dirty="0">
+              <a:latin typeface="Calibri" pitchFamily="34" charset="0"/>
+            </a:endParaRPr>
+          </a:p>
+          <a:p>
+            <a:r>
+              <a:rPr lang="en-US" sz="1400" i="1" dirty="0">
                 <a:latin typeface="Calibri" pitchFamily="34" charset="0"/>
               </a:rPr>
               <a:t>X75,000 = 4.4MB</a:t>
@@ -3848,7 +3857,7 @@
         </p:nvSpPr>
         <p:spPr>
           <a:xfrm>
-            <a:off x="3454400" y="4402138"/>
+            <a:off x="3352800" y="4402138"/>
             <a:ext cx="1720850" cy="593725"/>
           </a:xfrm>
           <a:prstGeom prst="rect">
@@ -3902,7 +3911,7 @@
         </p:nvSpPr>
         <p:spPr bwMode="auto">
           <a:xfrm>
-            <a:off x="3433763" y="4402138"/>
+            <a:off x="3352800" y="4402138"/>
             <a:ext cx="1343025" cy="523875"/>
           </a:xfrm>
           <a:prstGeom prst="rect">
@@ -3923,7 +3932,7 @@
           <a:lstStyle/>
           <a:p>
             <a:r>
-              <a:rPr lang="en-US" sz="1400">
+              <a:rPr lang="en-US" sz="1400" dirty="0">
                 <a:latin typeface="Calibri" pitchFamily="34" charset="0"/>
               </a:rPr>
               <a:t>            Supplier</a:t>
@@ -3931,7 +3940,7 @@
           </a:p>
           <a:p>
             <a:r>
-              <a:rPr lang="en-US" sz="1400" i="1">
+              <a:rPr lang="en-US" sz="1400" i="1" dirty="0">
                 <a:latin typeface="Calibri" pitchFamily="34" charset="0"/>
               </a:rPr>
               <a:t>           x400,000 </a:t>
@@ -3949,7 +3958,7 @@
         </p:nvSpPr>
         <p:spPr bwMode="auto">
           <a:xfrm>
-            <a:off x="3508375" y="1489075"/>
+            <a:off x="3444875" y="1489075"/>
             <a:ext cx="1203325" cy="523875"/>
           </a:xfrm>
           <a:prstGeom prst="rect">
@@ -3970,7 +3979,7 @@
           <a:lstStyle/>
           <a:p>
             <a:r>
-              <a:rPr lang="en-US" sz="1400">
+              <a:rPr lang="en-US" sz="1400" dirty="0">
                 <a:latin typeface="Calibri" pitchFamily="34" charset="0"/>
               </a:rPr>
               <a:t>         Product</a:t>
@@ -3978,13 +3987,13 @@
           </a:p>
           <a:p>
             <a:r>
-              <a:rPr lang="en-US" sz="1400">
+              <a:rPr lang="en-US" sz="1400" dirty="0">
                 <a:latin typeface="Calibri" pitchFamily="34" charset="0"/>
               </a:rPr>
               <a:t>        x</a:t>
             </a:r>
             <a:r>
-              <a:rPr lang="en-US" sz="1400" i="1">
+              <a:rPr lang="en-US" sz="1400" i="1" dirty="0">
                 <a:latin typeface="Calibri" pitchFamily="34" charset="0"/>
               </a:rPr>
               <a:t>100,000 </a:t>

</xml_diff>